<commit_message>
Final PPT for Diabetic prediction for Empirical analysis
</commit_message>
<xml_diff>
--- a/Final_ppt.pptx
+++ b/Final_ppt.pptx
@@ -13,14 +13,14 @@
     <p:sldId id="261" r:id="rId7"/>
     <p:sldId id="263" r:id="rId8"/>
     <p:sldId id="264" r:id="rId9"/>
-    <p:sldId id="276" r:id="rId10"/>
-    <p:sldId id="266" r:id="rId11"/>
-    <p:sldId id="272" r:id="rId12"/>
-    <p:sldId id="273" r:id="rId13"/>
-    <p:sldId id="267" r:id="rId14"/>
-    <p:sldId id="268" r:id="rId15"/>
-    <p:sldId id="269" r:id="rId16"/>
-    <p:sldId id="274" r:id="rId17"/>
+    <p:sldId id="267" r:id="rId10"/>
+    <p:sldId id="276" r:id="rId11"/>
+    <p:sldId id="268" r:id="rId12"/>
+    <p:sldId id="269" r:id="rId13"/>
+    <p:sldId id="274" r:id="rId14"/>
+    <p:sldId id="266" r:id="rId15"/>
+    <p:sldId id="272" r:id="rId16"/>
+    <p:sldId id="273" r:id="rId17"/>
     <p:sldId id="265" r:id="rId18"/>
   </p:sldIdLst>
   <p:sldSz cx="12192000" cy="6858000"/>
@@ -43,18 +43,18 @@
             <p14:sldId id="261"/>
             <p14:sldId id="263"/>
             <p14:sldId id="264"/>
-            <p14:sldId id="276"/>
-            <p14:sldId id="266"/>
-            <p14:sldId id="272"/>
-            <p14:sldId id="273"/>
           </p14:sldIdLst>
         </p14:section>
         <p14:section name="Untitled Section" id="{FB93767A-1909-7B45-B264-C9A3F6661506}">
           <p14:sldIdLst>
             <p14:sldId id="267"/>
+            <p14:sldId id="276"/>
             <p14:sldId id="268"/>
             <p14:sldId id="269"/>
             <p14:sldId id="274"/>
+            <p14:sldId id="266"/>
+            <p14:sldId id="272"/>
+            <p14:sldId id="273"/>
             <p14:sldId id="265"/>
           </p14:sldIdLst>
         </p14:section>
@@ -229,7 +229,7 @@
           <a:p>
             <a:fld id="{1D8BD707-D9CF-40AE-B4C6-C98DA3205C09}" type="datetimeFigureOut">
               <a:rPr lang="en-US"/>
-              <a:t>12/2/23</a:t>
+              <a:t>12/3/2023</a:t>
             </a:fld>
             <a:endParaRPr lang="en-US"/>
           </a:p>
@@ -406,7 +406,7 @@
           <a:p>
             <a:fld id="{1D8BD707-D9CF-40AE-B4C6-C98DA3205C09}" type="datetimeFigureOut">
               <a:rPr lang="en-US"/>
-              <a:t>12/2/23</a:t>
+              <a:t>12/3/2023</a:t>
             </a:fld>
             <a:endParaRPr lang="en-US"/>
           </a:p>
@@ -620,7 +620,7 @@
           <a:p>
             <a:fld id="{1D8BD707-D9CF-40AE-B4C6-C98DA3205C09}" type="datetimeFigureOut">
               <a:rPr lang="en-US"/>
-              <a:t>12/2/23</a:t>
+              <a:t>12/3/2023</a:t>
             </a:fld>
             <a:endParaRPr lang="en-US"/>
           </a:p>
@@ -768,7 +768,7 @@
           <a:p>
             <a:fld id="{1D8BD707-D9CF-40AE-B4C6-C98DA3205C09}" type="datetimeFigureOut">
               <a:rPr lang="en-US"/>
-              <a:t>12/2/23</a:t>
+              <a:t>12/3/2023</a:t>
             </a:fld>
             <a:endParaRPr lang="en-US"/>
           </a:p>
@@ -887,7 +887,7 @@
           <a:p>
             <a:fld id="{1D8BD707-D9CF-40AE-B4C6-C98DA3205C09}" type="datetimeFigureOut">
               <a:rPr lang="en-US"/>
-              <a:t>12/2/23</a:t>
+              <a:t>12/3/2023</a:t>
             </a:fld>
             <a:endParaRPr lang="en-US"/>
           </a:p>
@@ -1603,7 +1603,7 @@
           <a:p>
             <a:fld id="{1D8BD707-D9CF-40AE-B4C6-C98DA3205C09}" type="datetimeFigureOut">
               <a:rPr lang="en-US"/>
-              <a:t>12/2/23</a:t>
+              <a:t>12/3/2023</a:t>
             </a:fld>
             <a:endParaRPr lang="en-US"/>
           </a:p>
@@ -2494,612 +2494,7 @@
           <p:cNvPr id="2" name="Title 1">
             <a:extLst>
               <a:ext uri="{FF2B5EF4-FFF2-40B4-BE49-F238E27FC236}">
-                <a16:creationId xmlns:a16="http://schemas.microsoft.com/office/drawing/2014/main" id="{4754D45B-6D61-224A-447D-61E77A01B5F7}"/>
-              </a:ext>
-            </a:extLst>
-          </p:cNvPr>
-          <p:cNvSpPr>
-            <a:spLocks noGrp="1"/>
-          </p:cNvSpPr>
-          <p:nvPr>
-            <p:ph type="title"/>
-          </p:nvPr>
-        </p:nvSpPr>
-        <p:spPr>
-          <a:xfrm>
-            <a:off x="381000" y="175426"/>
-            <a:ext cx="5257800" cy="586574"/>
-          </a:xfrm>
-        </p:spPr>
-        <p:txBody>
-          <a:bodyPr/>
-          <a:lstStyle/>
-          <a:p>
-            <a:pPr algn="l"/>
-            <a:r>
-              <a:rPr lang="en-US" dirty="0"/>
-              <a:t>SPSS </a:t>
-            </a:r>
-            <a:r>
-              <a:rPr lang="en-IN" sz="3600" b="1" kern="0" dirty="0">
-                <a:effectLst/>
-                <a:latin typeface="Times New Roman" panose="02020603050405020304" pitchFamily="18" charset="0"/>
-                <a:ea typeface="Times New Roman" panose="02020603050405020304" pitchFamily="18" charset="0"/>
-                <a:cs typeface="Times New Roman" panose="02020603050405020304" pitchFamily="18" charset="0"/>
-              </a:rPr>
-              <a:t>REGRESSION:</a:t>
-            </a:r>
-            <a:br>
-              <a:rPr lang="en-IN" sz="3600" kern="100" dirty="0">
-                <a:effectLst/>
-                <a:latin typeface="Calibri" panose="020F0502020204030204" pitchFamily="34" charset="0"/>
-                <a:ea typeface="Calibri" panose="020F0502020204030204" pitchFamily="34" charset="0"/>
-                <a:cs typeface="Times New Roman" panose="02020603050405020304" pitchFamily="18" charset="0"/>
-              </a:rPr>
-            </a:br>
-            <a:endParaRPr lang="en-US" dirty="0"/>
-          </a:p>
-        </p:txBody>
-      </p:sp>
-      <p:sp>
-        <p:nvSpPr>
-          <p:cNvPr id="4" name="Subtitle 3">
-            <a:extLst>
-              <a:ext uri="{FF2B5EF4-FFF2-40B4-BE49-F238E27FC236}">
-                <a16:creationId xmlns:a16="http://schemas.microsoft.com/office/drawing/2014/main" id="{CF442A88-2C89-CBA9-437B-A4A599654F2E}"/>
-              </a:ext>
-            </a:extLst>
-          </p:cNvPr>
-          <p:cNvSpPr>
-            <a:spLocks noGrp="1"/>
-          </p:cNvSpPr>
-          <p:nvPr>
-            <p:ph sz="half" idx="2"/>
-          </p:nvPr>
-        </p:nvSpPr>
-        <p:spPr>
-          <a:xfrm>
-            <a:off x="304800" y="1066800"/>
-            <a:ext cx="5608320" cy="4818820"/>
-          </a:xfrm>
-        </p:spPr>
-        <p:txBody>
-          <a:bodyPr/>
-          <a:lstStyle/>
-          <a:p>
-            <a:pPr marL="342900" indent="-342900" algn="l">
-              <a:lnSpc>
-                <a:spcPct val="107000"/>
-              </a:lnSpc>
-              <a:buFont typeface="Wingdings" pitchFamily="2" charset="2"/>
-              <a:buChar char="Ø"/>
-            </a:pPr>
-            <a:r>
-              <a:rPr lang="en-IN" sz="2400" kern="0" dirty="0">
-                <a:effectLst/>
-                <a:latin typeface="Times New Roman" panose="02020603050405020304" pitchFamily="18" charset="0"/>
-                <a:ea typeface="Times New Roman" panose="02020603050405020304" pitchFamily="18" charset="0"/>
-                <a:cs typeface="Times New Roman" panose="02020603050405020304" pitchFamily="18" charset="0"/>
-              </a:rPr>
-              <a:t>The </a:t>
-            </a:r>
-            <a:r>
-              <a:rPr lang="en-IN" sz="2400" kern="0" dirty="0" err="1">
-                <a:effectLst/>
-                <a:latin typeface="Times New Roman" panose="02020603050405020304" pitchFamily="18" charset="0"/>
-                <a:ea typeface="Times New Roman" panose="02020603050405020304" pitchFamily="18" charset="0"/>
-                <a:cs typeface="Times New Roman" panose="02020603050405020304" pitchFamily="18" charset="0"/>
-              </a:rPr>
-              <a:t>spss</a:t>
-            </a:r>
-            <a:r>
-              <a:rPr lang="en-IN" sz="2400" kern="0" dirty="0">
-                <a:effectLst/>
-                <a:latin typeface="Times New Roman" panose="02020603050405020304" pitchFamily="18" charset="0"/>
-                <a:ea typeface="Times New Roman" panose="02020603050405020304" pitchFamily="18" charset="0"/>
-                <a:cs typeface="Times New Roman" panose="02020603050405020304" pitchFamily="18" charset="0"/>
-              </a:rPr>
-              <a:t> for liner regression is done for the diabetes dataset.</a:t>
-            </a:r>
-            <a:endParaRPr lang="en-IN" sz="2400" kern="100" dirty="0">
-              <a:effectLst/>
-              <a:latin typeface="Calibri" panose="020F0502020204030204" pitchFamily="34" charset="0"/>
-              <a:ea typeface="Times New Roman" panose="02020603050405020304" pitchFamily="18" charset="0"/>
-              <a:cs typeface="Times New Roman" panose="02020603050405020304" pitchFamily="18" charset="0"/>
-            </a:endParaRPr>
-          </a:p>
-          <a:p>
-            <a:pPr marL="342900" lvl="0" indent="-342900" algn="l">
-              <a:lnSpc>
-                <a:spcPct val="107000"/>
-              </a:lnSpc>
-              <a:buFont typeface="Wingdings" pitchFamily="2" charset="2"/>
-              <a:buChar char="Ø"/>
-            </a:pPr>
-            <a:r>
-              <a:rPr lang="en-IN" sz="2400" kern="0" dirty="0">
-                <a:effectLst/>
-                <a:latin typeface="Times New Roman" panose="02020603050405020304" pitchFamily="18" charset="0"/>
-                <a:ea typeface="Times New Roman" panose="02020603050405020304" pitchFamily="18" charset="0"/>
-                <a:cs typeface="Times New Roman" panose="02020603050405020304" pitchFamily="18" charset="0"/>
-              </a:rPr>
-              <a:t>Here the dependent variable is Diabetes and the independent variable is hypertension, </a:t>
-            </a:r>
-            <a:r>
-              <a:rPr lang="en-IN" sz="2400" kern="0" dirty="0" err="1">
-                <a:effectLst/>
-                <a:latin typeface="Times New Roman" panose="02020603050405020304" pitchFamily="18" charset="0"/>
-                <a:ea typeface="Times New Roman" panose="02020603050405020304" pitchFamily="18" charset="0"/>
-                <a:cs typeface="Times New Roman" panose="02020603050405020304" pitchFamily="18" charset="0"/>
-              </a:rPr>
-              <a:t>blood_glucose_level</a:t>
-            </a:r>
-            <a:r>
-              <a:rPr lang="en-IN" sz="2400" kern="0" dirty="0">
-                <a:effectLst/>
-                <a:latin typeface="Times New Roman" panose="02020603050405020304" pitchFamily="18" charset="0"/>
-                <a:ea typeface="Times New Roman" panose="02020603050405020304" pitchFamily="18" charset="0"/>
-                <a:cs typeface="Times New Roman" panose="02020603050405020304" pitchFamily="18" charset="0"/>
-              </a:rPr>
-              <a:t>, </a:t>
-            </a:r>
-            <a:r>
-              <a:rPr lang="en-IN" sz="2400" kern="0" dirty="0" err="1">
-                <a:effectLst/>
-                <a:latin typeface="Times New Roman" panose="02020603050405020304" pitchFamily="18" charset="0"/>
-                <a:ea typeface="Times New Roman" panose="02020603050405020304" pitchFamily="18" charset="0"/>
-                <a:cs typeface="Times New Roman" panose="02020603050405020304" pitchFamily="18" charset="0"/>
-              </a:rPr>
-              <a:t>bmi^b</a:t>
-            </a:r>
-            <a:r>
-              <a:rPr lang="en-IN" sz="2400" kern="0" dirty="0">
-                <a:effectLst/>
-                <a:latin typeface="Times New Roman" panose="02020603050405020304" pitchFamily="18" charset="0"/>
-                <a:ea typeface="Times New Roman" panose="02020603050405020304" pitchFamily="18" charset="0"/>
-                <a:cs typeface="Times New Roman" panose="02020603050405020304" pitchFamily="18" charset="0"/>
-              </a:rPr>
-              <a:t>.</a:t>
-            </a:r>
-            <a:endParaRPr lang="en-IN" sz="2400" kern="100" dirty="0">
-              <a:effectLst/>
-              <a:latin typeface="Calibri" panose="020F0502020204030204" pitchFamily="34" charset="0"/>
-              <a:ea typeface="Times New Roman" panose="02020603050405020304" pitchFamily="18" charset="0"/>
-              <a:cs typeface="Times New Roman" panose="02020603050405020304" pitchFamily="18" charset="0"/>
-            </a:endParaRPr>
-          </a:p>
-          <a:p>
-            <a:pPr marL="342900" lvl="0" indent="-342900" algn="l">
-              <a:lnSpc>
-                <a:spcPct val="107000"/>
-              </a:lnSpc>
-              <a:spcAft>
-                <a:spcPts val="800"/>
-              </a:spcAft>
-              <a:buFont typeface="Wingdings" pitchFamily="2" charset="2"/>
-              <a:buChar char="Ø"/>
-            </a:pPr>
-            <a:r>
-              <a:rPr lang="en-IN" sz="2400" kern="0" dirty="0">
-                <a:effectLst/>
-                <a:latin typeface="Times New Roman" panose="02020603050405020304" pitchFamily="18" charset="0"/>
-                <a:ea typeface="Times New Roman" panose="02020603050405020304" pitchFamily="18" charset="0"/>
-                <a:cs typeface="Times New Roman" panose="02020603050405020304" pitchFamily="18" charset="0"/>
-              </a:rPr>
-              <a:t>The ANOVA Table will decide if the model is significant or not. Here the Sig value &lt;0.05, then there is Linear Relationship between the independent and dependent variable, there is some random slope value.</a:t>
-            </a:r>
-          </a:p>
-          <a:p>
-            <a:pPr algn="l"/>
-            <a:endParaRPr lang="en-US" sz="2400" dirty="0"/>
-          </a:p>
-        </p:txBody>
-      </p:sp>
-      <p:sp>
-        <p:nvSpPr>
-          <p:cNvPr id="7" name="Content Placeholder 6">
-            <a:extLst>
-              <a:ext uri="{FF2B5EF4-FFF2-40B4-BE49-F238E27FC236}">
-                <a16:creationId xmlns:a16="http://schemas.microsoft.com/office/drawing/2014/main" id="{D8EED4DE-9734-3EB5-9267-7D5D6A3408E8}"/>
-              </a:ext>
-            </a:extLst>
-          </p:cNvPr>
-          <p:cNvSpPr>
-            <a:spLocks noGrp="1"/>
-          </p:cNvSpPr>
-          <p:nvPr>
-            <p:ph sz="half" idx="3"/>
-          </p:nvPr>
-        </p:nvSpPr>
-        <p:spPr>
-          <a:xfrm>
-            <a:off x="6278880" y="304800"/>
-            <a:ext cx="5760720" cy="762000"/>
-          </a:xfrm>
-        </p:spPr>
-        <p:txBody>
-          <a:bodyPr/>
-          <a:lstStyle/>
-          <a:p>
-            <a:r>
-              <a:rPr lang="en-US" dirty="0"/>
-              <a:t>Output:</a:t>
-            </a:r>
-          </a:p>
-        </p:txBody>
-      </p:sp>
-      <p:pic>
-        <p:nvPicPr>
-          <p:cNvPr id="8" name="image9.png">
-            <a:extLst>
-              <a:ext uri="{FF2B5EF4-FFF2-40B4-BE49-F238E27FC236}">
-                <a16:creationId xmlns:a16="http://schemas.microsoft.com/office/drawing/2014/main" id="{A7DA67F6-A9B6-0073-9BCF-308A5574D1EA}"/>
-              </a:ext>
-            </a:extLst>
-          </p:cNvPr>
-          <p:cNvPicPr>
-            <a:picLocks noChangeAspect="1"/>
-          </p:cNvPicPr>
-          <p:nvPr/>
-        </p:nvPicPr>
-        <p:blipFill>
-          <a:blip r:embed="rId2" cstate="print"/>
-          <a:stretch>
-            <a:fillRect/>
-          </a:stretch>
-        </p:blipFill>
-        <p:spPr>
-          <a:xfrm>
-            <a:off x="6278880" y="1066800"/>
-            <a:ext cx="5608320" cy="5486400"/>
-          </a:xfrm>
-          <a:prstGeom prst="rect">
-            <a:avLst/>
-          </a:prstGeom>
-        </p:spPr>
-      </p:pic>
-    </p:spTree>
-    <p:extLst>
-      <p:ext uri="{BB962C8B-B14F-4D97-AF65-F5344CB8AC3E}">
-        <p14:creationId xmlns:p14="http://schemas.microsoft.com/office/powerpoint/2010/main" val="2183717736"/>
-      </p:ext>
-    </p:extLst>
-  </p:cSld>
-  <p:clrMapOvr>
-    <a:masterClrMapping/>
-  </p:clrMapOvr>
-</p:sld>
-</file>
-
-<file path=ppt/slides/slide11.xml><?xml version="1.0" encoding="utf-8"?>
-<p:sld xmlns:a="http://schemas.openxmlformats.org/drawingml/2006/main" xmlns:r="http://schemas.openxmlformats.org/officeDocument/2006/relationships" xmlns:p="http://schemas.openxmlformats.org/presentationml/2006/main">
-  <p:cSld>
-    <p:spTree>
-      <p:nvGrpSpPr>
-        <p:cNvPr id="1" name=""/>
-        <p:cNvGrpSpPr/>
-        <p:nvPr/>
-      </p:nvGrpSpPr>
-      <p:grpSpPr>
-        <a:xfrm>
-          <a:off x="0" y="0"/>
-          <a:ext cx="0" cy="0"/>
-          <a:chOff x="0" y="0"/>
-          <a:chExt cx="0" cy="0"/>
-        </a:xfrm>
-      </p:grpSpPr>
-      <p:sp>
-        <p:nvSpPr>
-          <p:cNvPr id="2" name="Title 1">
-            <a:extLst>
-              <a:ext uri="{FF2B5EF4-FFF2-40B4-BE49-F238E27FC236}">
-                <a16:creationId xmlns:a16="http://schemas.microsoft.com/office/drawing/2014/main" id="{F5317CE7-607C-DAB5-6711-FEF2D2562A24}"/>
-              </a:ext>
-            </a:extLst>
-          </p:cNvPr>
-          <p:cNvSpPr>
-            <a:spLocks noGrp="1"/>
-          </p:cNvSpPr>
-          <p:nvPr>
-            <p:ph type="title"/>
-          </p:nvPr>
-        </p:nvSpPr>
-        <p:spPr>
-          <a:xfrm>
-            <a:off x="756074" y="626896"/>
-            <a:ext cx="3434926" cy="668504"/>
-          </a:xfrm>
-        </p:spPr>
-        <p:txBody>
-          <a:bodyPr/>
-          <a:lstStyle/>
-          <a:p>
-            <a:r>
-              <a:rPr lang="en-IN" b="1" kern="0" dirty="0">
-                <a:effectLst/>
-                <a:latin typeface="Times New Roman" panose="02020603050405020304" pitchFamily="18" charset="0"/>
-                <a:ea typeface="Times New Roman" panose="02020603050405020304" pitchFamily="18" charset="0"/>
-                <a:cs typeface="Times New Roman" panose="02020603050405020304" pitchFamily="18" charset="0"/>
-              </a:rPr>
-              <a:t>CO-RELATION</a:t>
-            </a:r>
-            <a:br>
-              <a:rPr lang="en-IN" kern="100" dirty="0">
-                <a:effectLst/>
-                <a:latin typeface="Calibri" panose="020F0502020204030204" pitchFamily="34" charset="0"/>
-                <a:ea typeface="Calibri" panose="020F0502020204030204" pitchFamily="34" charset="0"/>
-                <a:cs typeface="Times New Roman" panose="02020603050405020304" pitchFamily="18" charset="0"/>
-              </a:rPr>
-            </a:br>
-            <a:endParaRPr lang="en-US" dirty="0"/>
-          </a:p>
-        </p:txBody>
-      </p:sp>
-      <p:sp>
-        <p:nvSpPr>
-          <p:cNvPr id="3" name="Content Placeholder 2">
-            <a:extLst>
-              <a:ext uri="{FF2B5EF4-FFF2-40B4-BE49-F238E27FC236}">
-                <a16:creationId xmlns:a16="http://schemas.microsoft.com/office/drawing/2014/main" id="{AC1E53E2-9F12-C1BA-DEA4-4D10ECE8D7E4}"/>
-              </a:ext>
-            </a:extLst>
-          </p:cNvPr>
-          <p:cNvSpPr>
-            <a:spLocks noGrp="1"/>
-          </p:cNvSpPr>
-          <p:nvPr>
-            <p:ph sz="half" idx="2"/>
-          </p:nvPr>
-        </p:nvSpPr>
-        <p:spPr>
-          <a:xfrm>
-            <a:off x="609600" y="1295400"/>
-            <a:ext cx="5303520" cy="4028475"/>
-          </a:xfrm>
-        </p:spPr>
-        <p:txBody>
-          <a:bodyPr/>
-          <a:lstStyle/>
-          <a:p>
-            <a:pPr lvl="0">
-              <a:lnSpc>
-                <a:spcPct val="107000"/>
-              </a:lnSpc>
-            </a:pPr>
-            <a:endParaRPr lang="en-IN" sz="2400" kern="0" dirty="0">
-              <a:effectLst/>
-              <a:latin typeface="Times New Roman" panose="02020603050405020304" pitchFamily="18" charset="0"/>
-              <a:ea typeface="Times New Roman" panose="02020603050405020304" pitchFamily="18" charset="0"/>
-              <a:cs typeface="Times New Roman" panose="02020603050405020304" pitchFamily="18" charset="0"/>
-            </a:endParaRPr>
-          </a:p>
-          <a:p>
-            <a:pPr marL="342900" lvl="0" indent="-342900">
-              <a:lnSpc>
-                <a:spcPct val="107000"/>
-              </a:lnSpc>
-              <a:buFont typeface="Wingdings" pitchFamily="2" charset="2"/>
-              <a:buChar char="Ø"/>
-            </a:pPr>
-            <a:r>
-              <a:rPr lang="en-IN" sz="2400" kern="0" dirty="0">
-                <a:effectLst/>
-                <a:latin typeface="Times New Roman" panose="02020603050405020304" pitchFamily="18" charset="0"/>
-                <a:ea typeface="Times New Roman" panose="02020603050405020304" pitchFamily="18" charset="0"/>
-                <a:cs typeface="Times New Roman" panose="02020603050405020304" pitchFamily="18" charset="0"/>
-              </a:rPr>
-              <a:t>The Coefficient Box gives the linear equation. The Pearson Correlation value is 0.467 for 20% sample (Testing) and 0.478 for 80% of the Sample (Training). The values are nearly similar to each other. </a:t>
-            </a:r>
-            <a:endParaRPr lang="en-IN" sz="2400" kern="100" dirty="0">
-              <a:effectLst/>
-              <a:latin typeface="Calibri" panose="020F0502020204030204" pitchFamily="34" charset="0"/>
-              <a:ea typeface="Times New Roman" panose="02020603050405020304" pitchFamily="18" charset="0"/>
-              <a:cs typeface="Times New Roman" panose="02020603050405020304" pitchFamily="18" charset="0"/>
-            </a:endParaRPr>
-          </a:p>
-          <a:p>
-            <a:pPr marL="342900" lvl="0" indent="-342900">
-              <a:lnSpc>
-                <a:spcPct val="107000"/>
-              </a:lnSpc>
-              <a:spcAft>
-                <a:spcPts val="800"/>
-              </a:spcAft>
-              <a:buFont typeface="Wingdings" pitchFamily="2" charset="2"/>
-              <a:buChar char="Ø"/>
-            </a:pPr>
-            <a:r>
-              <a:rPr lang="en-IN" sz="2400" kern="0" dirty="0">
-                <a:effectLst/>
-                <a:latin typeface="Times New Roman" panose="02020603050405020304" pitchFamily="18" charset="0"/>
-                <a:ea typeface="Times New Roman" panose="02020603050405020304" pitchFamily="18" charset="0"/>
-                <a:cs typeface="Times New Roman" panose="02020603050405020304" pitchFamily="18" charset="0"/>
-              </a:rPr>
-              <a:t>Hence, we can conclude that our model is neither underfitting nor overfitting.</a:t>
-            </a:r>
-            <a:endParaRPr lang="en-IN" sz="2400" kern="100" dirty="0">
-              <a:effectLst/>
-              <a:latin typeface="Calibri" panose="020F0502020204030204" pitchFamily="34" charset="0"/>
-              <a:ea typeface="Times New Roman" panose="02020603050405020304" pitchFamily="18" charset="0"/>
-              <a:cs typeface="Times New Roman" panose="02020603050405020304" pitchFamily="18" charset="0"/>
-            </a:endParaRPr>
-          </a:p>
-          <a:p>
-            <a:endParaRPr lang="en-US" sz="2400" dirty="0"/>
-          </a:p>
-        </p:txBody>
-      </p:sp>
-      <p:pic>
-        <p:nvPicPr>
-          <p:cNvPr id="5" name="image11.png">
-            <a:extLst>
-              <a:ext uri="{FF2B5EF4-FFF2-40B4-BE49-F238E27FC236}">
-                <a16:creationId xmlns:a16="http://schemas.microsoft.com/office/drawing/2014/main" id="{965FEFFD-DCF8-C34A-CD2D-B42F82F0A9D8}"/>
-              </a:ext>
-            </a:extLst>
-          </p:cNvPr>
-          <p:cNvPicPr>
-            <a:picLocks noGrp="1" noChangeAspect="1"/>
-          </p:cNvPicPr>
-          <p:nvPr>
-            <p:ph sz="half" idx="3"/>
-          </p:nvPr>
-        </p:nvPicPr>
-        <p:blipFill>
-          <a:blip r:embed="rId2" cstate="print"/>
-          <a:stretch>
-            <a:fillRect/>
-          </a:stretch>
-        </p:blipFill>
-        <p:spPr>
-          <a:xfrm>
-            <a:off x="7086600" y="1295400"/>
-            <a:ext cx="4876799" cy="4953000"/>
-          </a:xfrm>
-          <a:prstGeom prst="rect">
-            <a:avLst/>
-          </a:prstGeom>
-        </p:spPr>
-      </p:pic>
-      <p:sp>
-        <p:nvSpPr>
-          <p:cNvPr id="6" name="Content Placeholder 6">
-            <a:extLst>
-              <a:ext uri="{FF2B5EF4-FFF2-40B4-BE49-F238E27FC236}">
-                <a16:creationId xmlns:a16="http://schemas.microsoft.com/office/drawing/2014/main" id="{720063F9-8F9B-CB1B-6E30-AAA86F3095DE}"/>
-              </a:ext>
-            </a:extLst>
-          </p:cNvPr>
-          <p:cNvSpPr txBox="1">
-            <a:spLocks/>
-          </p:cNvSpPr>
-          <p:nvPr/>
-        </p:nvSpPr>
-        <p:spPr>
-          <a:xfrm>
-            <a:off x="6934200" y="609600"/>
-            <a:ext cx="5105400" cy="430887"/>
-          </a:xfrm>
-          <a:prstGeom prst="rect">
-            <a:avLst/>
-          </a:prstGeom>
-        </p:spPr>
-        <p:txBody>
-          <a:bodyPr wrap="square" lIns="0" tIns="0" rIns="0" bIns="0">
-            <a:spAutoFit/>
-          </a:bodyPr>
-          <a:lstStyle>
-            <a:lvl1pPr marL="0">
-              <a:defRPr sz="2800" b="0" i="0">
-                <a:solidFill>
-                  <a:schemeClr val="tx1"/>
-                </a:solidFill>
-                <a:latin typeface="Times New Roman"/>
-                <a:ea typeface="+mn-ea"/>
-                <a:cs typeface="Times New Roman"/>
-              </a:defRPr>
-            </a:lvl1pPr>
-            <a:lvl2pPr marL="457200">
-              <a:defRPr>
-                <a:latin typeface="+mn-lt"/>
-                <a:ea typeface="+mn-ea"/>
-                <a:cs typeface="+mn-cs"/>
-              </a:defRPr>
-            </a:lvl2pPr>
-            <a:lvl3pPr marL="914400">
-              <a:defRPr>
-                <a:latin typeface="+mn-lt"/>
-                <a:ea typeface="+mn-ea"/>
-                <a:cs typeface="+mn-cs"/>
-              </a:defRPr>
-            </a:lvl3pPr>
-            <a:lvl4pPr marL="1371600">
-              <a:defRPr>
-                <a:latin typeface="+mn-lt"/>
-                <a:ea typeface="+mn-ea"/>
-                <a:cs typeface="+mn-cs"/>
-              </a:defRPr>
-            </a:lvl4pPr>
-            <a:lvl5pPr marL="1828800">
-              <a:defRPr>
-                <a:latin typeface="+mn-lt"/>
-                <a:ea typeface="+mn-ea"/>
-                <a:cs typeface="+mn-cs"/>
-              </a:defRPr>
-            </a:lvl5pPr>
-            <a:lvl6pPr marL="2286000">
-              <a:defRPr>
-                <a:latin typeface="+mn-lt"/>
-                <a:ea typeface="+mn-ea"/>
-                <a:cs typeface="+mn-cs"/>
-              </a:defRPr>
-            </a:lvl6pPr>
-            <a:lvl7pPr marL="2743200">
-              <a:defRPr>
-                <a:latin typeface="+mn-lt"/>
-                <a:ea typeface="+mn-ea"/>
-                <a:cs typeface="+mn-cs"/>
-              </a:defRPr>
-            </a:lvl7pPr>
-            <a:lvl8pPr marL="3200400">
-              <a:defRPr>
-                <a:latin typeface="+mn-lt"/>
-                <a:ea typeface="+mn-ea"/>
-                <a:cs typeface="+mn-cs"/>
-              </a:defRPr>
-            </a:lvl8pPr>
-            <a:lvl9pPr marL="3657600">
-              <a:defRPr>
-                <a:latin typeface="+mn-lt"/>
-                <a:ea typeface="+mn-ea"/>
-                <a:cs typeface="+mn-cs"/>
-              </a:defRPr>
-            </a:lvl9pPr>
-          </a:lstStyle>
-          <a:p>
-            <a:r>
-              <a:rPr lang="en-US" dirty="0"/>
-              <a:t>Output:</a:t>
-            </a:r>
-          </a:p>
-        </p:txBody>
-      </p:sp>
-    </p:spTree>
-    <p:extLst>
-      <p:ext uri="{BB962C8B-B14F-4D97-AF65-F5344CB8AC3E}">
-        <p14:creationId xmlns:p14="http://schemas.microsoft.com/office/powerpoint/2010/main" val="3278949528"/>
-      </p:ext>
-    </p:extLst>
-  </p:cSld>
-  <p:clrMapOvr>
-    <a:masterClrMapping/>
-  </p:clrMapOvr>
-</p:sld>
-</file>
-
-<file path=ppt/slides/slide12.xml><?xml version="1.0" encoding="utf-8"?>
-<p:sld xmlns:a="http://schemas.openxmlformats.org/drawingml/2006/main" xmlns:r="http://schemas.openxmlformats.org/officeDocument/2006/relationships" xmlns:p="http://schemas.openxmlformats.org/presentationml/2006/main">
-  <p:cSld>
-    <p:spTree>
-      <p:nvGrpSpPr>
-        <p:cNvPr id="1" name=""/>
-        <p:cNvGrpSpPr/>
-        <p:nvPr/>
-      </p:nvGrpSpPr>
-      <p:grpSpPr>
-        <a:xfrm>
-          <a:off x="0" y="0"/>
-          <a:ext cx="0" cy="0"/>
-          <a:chOff x="0" y="0"/>
-          <a:chExt cx="0" cy="0"/>
-        </a:xfrm>
-      </p:grpSpPr>
-      <p:sp>
-        <p:nvSpPr>
-          <p:cNvPr id="2" name="Title 1">
-            <a:extLst>
-              <a:ext uri="{FF2B5EF4-FFF2-40B4-BE49-F238E27FC236}">
-                <a16:creationId xmlns:a16="http://schemas.microsoft.com/office/drawing/2014/main" id="{A0B141B5-45A7-D50D-F507-5C0887501C8E}"/>
+                <a16:creationId xmlns:a16="http://schemas.microsoft.com/office/drawing/2014/main" id="{4B888448-3636-2843-C26F-ED81DE46CD90}"/>
               </a:ext>
             </a:extLst>
           </p:cNvPr>
@@ -3116,9 +2511,13 @@
           <a:lstStyle/>
           <a:p>
             <a:r>
-              <a:rPr lang="en-US" dirty="0"/>
-              <a:t>T-test</a:t>
-            </a:r>
+              <a:rPr lang="en-US" dirty="0">
+                <a:latin typeface="Times New Roman" panose="02020603050405020304" pitchFamily="18" charset="0"/>
+                <a:cs typeface="Times New Roman" panose="02020603050405020304" pitchFamily="18" charset="0"/>
+              </a:rPr>
+              <a:t>UI Validations:</a:t>
+            </a:r>
+            <a:endParaRPr lang="en-US" dirty="0"/>
           </a:p>
         </p:txBody>
       </p:sp>
@@ -3127,7 +2526,7 @@
           <p:cNvPr id="3" name="Content Placeholder 2">
             <a:extLst>
               <a:ext uri="{FF2B5EF4-FFF2-40B4-BE49-F238E27FC236}">
-                <a16:creationId xmlns:a16="http://schemas.microsoft.com/office/drawing/2014/main" id="{0B1A201C-2D09-CE02-9C23-2D921D39DC4B}"/>
+                <a16:creationId xmlns:a16="http://schemas.microsoft.com/office/drawing/2014/main" id="{8C9C8AB2-0C59-8764-6C30-21925CB6A2AA}"/>
               </a:ext>
             </a:extLst>
           </p:cNvPr>
@@ -3140,103 +2539,140 @@
         </p:nvSpPr>
         <p:spPr>
           <a:xfrm>
-            <a:off x="609600" y="1577340"/>
-            <a:ext cx="5303520" cy="5111399"/>
+            <a:off x="609600" y="1200936"/>
+            <a:ext cx="5303520" cy="4690836"/>
           </a:xfrm>
         </p:spPr>
         <p:txBody>
           <a:bodyPr/>
           <a:lstStyle/>
           <a:p>
-            <a:pPr marL="342900" lvl="0" indent="-342900">
+            <a:pPr marL="285750" indent="-285750">
               <a:lnSpc>
                 <a:spcPct val="107000"/>
               </a:lnSpc>
+              <a:spcAft>
+                <a:spcPts val="800"/>
+              </a:spcAft>
               <a:buFont typeface="Wingdings" pitchFamily="2" charset="2"/>
               <a:buChar char="Ø"/>
             </a:pPr>
             <a:r>
-              <a:rPr lang="en-IN" sz="2400" kern="0" dirty="0">
+              <a:rPr lang="en-US" sz="2000" kern="100" dirty="0">
                 <a:effectLst/>
                 <a:latin typeface="Times New Roman" panose="02020603050405020304" pitchFamily="18" charset="0"/>
-                <a:ea typeface="Times New Roman" panose="02020603050405020304" pitchFamily="18" charset="0"/>
-                <a:cs typeface="Times New Roman" panose="02020603050405020304" pitchFamily="18" charset="0"/>
-              </a:rPr>
-              <a:t>The record for </a:t>
-            </a:r>
-            <a:r>
-              <a:rPr lang="en-IN" sz="2400" kern="0" dirty="0" err="1">
+                <a:ea typeface="Calibri" panose="020F0502020204030204" pitchFamily="34" charset="0"/>
+                <a:cs typeface="Times New Roman" panose="02020603050405020304" pitchFamily="18" charset="0"/>
+              </a:rPr>
+              <a:t>For field which are ‘text’ type is checked for the entered value is alphabetic or not using </a:t>
+            </a:r>
+            <a:r>
+              <a:rPr lang="en-US" sz="2000" kern="100" dirty="0" err="1">
                 <a:effectLst/>
                 <a:latin typeface="Times New Roman" panose="02020603050405020304" pitchFamily="18" charset="0"/>
-                <a:ea typeface="Times New Roman" panose="02020603050405020304" pitchFamily="18" charset="0"/>
-                <a:cs typeface="Times New Roman" panose="02020603050405020304" pitchFamily="18" charset="0"/>
-              </a:rPr>
-              <a:t>blood_glucose_level</a:t>
-            </a:r>
-            <a:r>
-              <a:rPr lang="en-IN" sz="2400" kern="0" dirty="0">
+                <a:ea typeface="Calibri" panose="020F0502020204030204" pitchFamily="34" charset="0"/>
+                <a:cs typeface="Times New Roman" panose="02020603050405020304" pitchFamily="18" charset="0"/>
+              </a:rPr>
+              <a:t>alphabetic.test</a:t>
+            </a:r>
+            <a:r>
+              <a:rPr lang="en-US" sz="2000" kern="100" dirty="0">
                 <a:effectLst/>
                 <a:latin typeface="Times New Roman" panose="02020603050405020304" pitchFamily="18" charset="0"/>
-                <a:ea typeface="Times New Roman" panose="02020603050405020304" pitchFamily="18" charset="0"/>
-                <a:cs typeface="Times New Roman" panose="02020603050405020304" pitchFamily="18" charset="0"/>
-              </a:rPr>
-              <a:t> is </a:t>
-            </a:r>
-            <a:r>
-              <a:rPr lang="en-IN" sz="2400" kern="0" dirty="0" err="1">
+                <a:ea typeface="Calibri" panose="020F0502020204030204" pitchFamily="34" charset="0"/>
+                <a:cs typeface="Times New Roman" panose="02020603050405020304" pitchFamily="18" charset="0"/>
+              </a:rPr>
+              <a:t>(</a:t>
+            </a:r>
+            <a:r>
+              <a:rPr lang="en-US" sz="2000" kern="100" dirty="0" err="1">
                 <a:effectLst/>
                 <a:latin typeface="Times New Roman" panose="02020603050405020304" pitchFamily="18" charset="0"/>
-                <a:ea typeface="Times New Roman" panose="02020603050405020304" pitchFamily="18" charset="0"/>
-                <a:cs typeface="Times New Roman" panose="02020603050405020304" pitchFamily="18" charset="0"/>
-              </a:rPr>
-              <a:t>analyzed</a:t>
-            </a:r>
-            <a:r>
-              <a:rPr lang="en-IN" sz="2400" kern="0" dirty="0">
+                <a:ea typeface="Calibri" panose="020F0502020204030204" pitchFamily="34" charset="0"/>
+                <a:cs typeface="Times New Roman" panose="02020603050405020304" pitchFamily="18" charset="0"/>
+              </a:rPr>
+              <a:t>fieldValue</a:t>
+            </a:r>
+            <a:r>
+              <a:rPr lang="en-US" sz="2000" kern="100" dirty="0">
                 <a:effectLst/>
                 <a:latin typeface="Times New Roman" panose="02020603050405020304" pitchFamily="18" charset="0"/>
-                <a:ea typeface="Times New Roman" panose="02020603050405020304" pitchFamily="18" charset="0"/>
-                <a:cs typeface="Times New Roman" panose="02020603050405020304" pitchFamily="18" charset="0"/>
-              </a:rPr>
-              <a:t> for diabetes the values are for the group as 0 and 1 which is classified as a person with diabetes or not.</a:t>
-            </a:r>
-          </a:p>
-          <a:p>
-            <a:pPr marL="342900" lvl="0" indent="-342900">
-              <a:lnSpc>
-                <a:spcPct val="107000"/>
-              </a:lnSpc>
-              <a:buFont typeface="Wingdings" pitchFamily="2" charset="2"/>
-              <a:buChar char="Ø"/>
-            </a:pPr>
-            <a:r>
-              <a:rPr lang="en-IN" sz="2400" kern="0" dirty="0">
+                <a:ea typeface="Calibri" panose="020F0502020204030204" pitchFamily="34" charset="0"/>
+                <a:cs typeface="Times New Roman" panose="02020603050405020304" pitchFamily="18" charset="0"/>
+              </a:rPr>
+              <a:t>). If not, an error is displayed.</a:t>
+            </a:r>
+            <a:br>
+              <a:rPr lang="en-US" sz="2000" kern="100" dirty="0">
                 <a:effectLst/>
                 <a:latin typeface="Times New Roman" panose="02020603050405020304" pitchFamily="18" charset="0"/>
-                <a:ea typeface="Times New Roman" panose="02020603050405020304" pitchFamily="18" charset="0"/>
-                <a:cs typeface="Times New Roman" panose="02020603050405020304" pitchFamily="18" charset="0"/>
-              </a:rPr>
-              <a:t>In the Group statistics the values for mean, standard deviation and standard error mean and the number of patients for groups 0 and 1are taken.</a:t>
-            </a:r>
-          </a:p>
-          <a:p>
-            <a:pPr marL="342900" indent="-342900">
-              <a:lnSpc>
-                <a:spcPct val="107000"/>
-              </a:lnSpc>
-              <a:buFont typeface="Wingdings" pitchFamily="2" charset="2"/>
-              <a:buChar char="Ø"/>
-            </a:pPr>
-            <a:r>
-              <a:rPr lang="en-IN" sz="2400" kern="0" dirty="0">
+                <a:ea typeface="Calibri" panose="020F0502020204030204" pitchFamily="34" charset="0"/>
+                <a:cs typeface="Times New Roman" panose="02020603050405020304" pitchFamily="18" charset="0"/>
+              </a:rPr>
+            </a:br>
+            <a:r>
+              <a:rPr lang="en-US" sz="2000" kern="100" dirty="0">
                 <a:effectLst/>
                 <a:latin typeface="Times New Roman" panose="02020603050405020304" pitchFamily="18" charset="0"/>
-                <a:ea typeface="Times New Roman" panose="02020603050405020304" pitchFamily="18" charset="0"/>
-                <a:cs typeface="Times New Roman" panose="02020603050405020304" pitchFamily="18" charset="0"/>
-              </a:rPr>
-              <a:t>From the t-test analysis we conclude that the groups 0 and 1 are unlike</a:t>
-            </a:r>
-            <a:endParaRPr lang="en-IN" sz="2400" kern="100" dirty="0">
+                <a:ea typeface="Calibri" panose="020F0502020204030204" pitchFamily="34" charset="0"/>
+                <a:cs typeface="Times New Roman" panose="02020603050405020304" pitchFamily="18" charset="0"/>
+              </a:rPr>
+              <a:t>For field which are ‘number’ type is checked for the entered value is numeric or not using </a:t>
+            </a:r>
+            <a:r>
+              <a:rPr lang="en-US" sz="2000" kern="100" dirty="0" err="1">
+                <a:effectLst/>
+                <a:latin typeface="Times New Roman" panose="02020603050405020304" pitchFamily="18" charset="0"/>
+                <a:ea typeface="Calibri" panose="020F0502020204030204" pitchFamily="34" charset="0"/>
+                <a:cs typeface="Times New Roman" panose="02020603050405020304" pitchFamily="18" charset="0"/>
+              </a:rPr>
+              <a:t>isNan</a:t>
+            </a:r>
+            <a:r>
+              <a:rPr lang="en-US" sz="2000" kern="100" dirty="0">
+                <a:effectLst/>
+                <a:latin typeface="Times New Roman" panose="02020603050405020304" pitchFamily="18" charset="0"/>
+                <a:ea typeface="Calibri" panose="020F0502020204030204" pitchFamily="34" charset="0"/>
+                <a:cs typeface="Times New Roman" panose="02020603050405020304" pitchFamily="18" charset="0"/>
+              </a:rPr>
+              <a:t>(</a:t>
+            </a:r>
+            <a:r>
+              <a:rPr lang="en-US" sz="2000" kern="100" dirty="0" err="1">
+                <a:effectLst/>
+                <a:latin typeface="Times New Roman" panose="02020603050405020304" pitchFamily="18" charset="0"/>
+                <a:ea typeface="Calibri" panose="020F0502020204030204" pitchFamily="34" charset="0"/>
+                <a:cs typeface="Times New Roman" panose="02020603050405020304" pitchFamily="18" charset="0"/>
+              </a:rPr>
+              <a:t>fieldValue</a:t>
+            </a:r>
+            <a:r>
+              <a:rPr lang="en-US" sz="2000" kern="100" dirty="0">
+                <a:effectLst/>
+                <a:latin typeface="Times New Roman" panose="02020603050405020304" pitchFamily="18" charset="0"/>
+                <a:ea typeface="Calibri" panose="020F0502020204030204" pitchFamily="34" charset="0"/>
+                <a:cs typeface="Times New Roman" panose="02020603050405020304" pitchFamily="18" charset="0"/>
+              </a:rPr>
+              <a:t>). If not, an error is displayed.</a:t>
+            </a:r>
+            <a:br>
+              <a:rPr lang="en-US" sz="2000" kern="100" dirty="0">
+                <a:effectLst/>
+                <a:latin typeface="Times New Roman" panose="02020603050405020304" pitchFamily="18" charset="0"/>
+                <a:ea typeface="Calibri" panose="020F0502020204030204" pitchFamily="34" charset="0"/>
+                <a:cs typeface="Times New Roman" panose="02020603050405020304" pitchFamily="18" charset="0"/>
+              </a:rPr>
+            </a:br>
+            <a:r>
+              <a:rPr lang="en-US" sz="2000" kern="100" dirty="0">
+                <a:effectLst/>
+                <a:latin typeface="Times New Roman" panose="02020603050405020304" pitchFamily="18" charset="0"/>
+                <a:ea typeface="Calibri" panose="020F0502020204030204" pitchFamily="34" charset="0"/>
+                <a:cs typeface="Times New Roman" panose="02020603050405020304" pitchFamily="18" charset="0"/>
+              </a:rPr>
+              <a:t>For field which are ‘select-one’ type is checked if a valid option is selected or not. If not, an error is displayed.</a:t>
+            </a:r>
+            <a:endParaRPr lang="en-IN" sz="2000" kern="100" dirty="0">
               <a:effectLst/>
               <a:latin typeface="Times New Roman" panose="02020603050405020304" pitchFamily="18" charset="0"/>
               <a:ea typeface="Calibri" panose="020F0502020204030204" pitchFamily="34" charset="0"/>
@@ -3244,66 +2680,58 @@
             </a:endParaRPr>
           </a:p>
           <a:p>
-            <a:pPr marL="342900" lvl="0" indent="-342900">
+            <a:pPr marL="285750" indent="-285750">
               <a:lnSpc>
                 <a:spcPct val="107000"/>
               </a:lnSpc>
+              <a:spcAft>
+                <a:spcPts val="800"/>
+              </a:spcAft>
               <a:buFont typeface="Wingdings" pitchFamily="2" charset="2"/>
               <a:buChar char="Ø"/>
             </a:pPr>
-            <a:endParaRPr lang="en-IN" sz="2400" kern="100" dirty="0">
+            <a:r>
+              <a:rPr lang="en-US" sz="2000" kern="100" dirty="0">
+                <a:effectLst/>
+                <a:latin typeface="Times New Roman" panose="02020603050405020304" pitchFamily="18" charset="0"/>
+                <a:ea typeface="Calibri" panose="020F0502020204030204" pitchFamily="34" charset="0"/>
+                <a:cs typeface="Times New Roman" panose="02020603050405020304" pitchFamily="18" charset="0"/>
+              </a:rPr>
+              <a:t>With this validation, the user input is checked if the input meets the criteria for each field. The error messages are displayed, which helps the user to know if the validation is failed.</a:t>
+            </a:r>
+            <a:endParaRPr lang="en-IN" sz="2000" kern="100" dirty="0">
               <a:effectLst/>
               <a:latin typeface="Times New Roman" panose="02020603050405020304" pitchFamily="18" charset="0"/>
               <a:ea typeface="Calibri" panose="020F0502020204030204" pitchFamily="34" charset="0"/>
               <a:cs typeface="Times New Roman" panose="02020603050405020304" pitchFamily="18" charset="0"/>
             </a:endParaRPr>
           </a:p>
-          <a:p>
-            <a:pPr marL="342900" lvl="0" indent="-342900">
-              <a:lnSpc>
-                <a:spcPct val="107000"/>
-              </a:lnSpc>
-              <a:buFont typeface="Symbol" pitchFamily="2" charset="2"/>
-              <a:buChar char=""/>
-            </a:pPr>
-            <a:endParaRPr lang="en-IN" sz="2400" kern="100" dirty="0">
-              <a:effectLst/>
-              <a:latin typeface="Calibri" panose="020F0502020204030204" pitchFamily="34" charset="0"/>
-              <a:ea typeface="Calibri" panose="020F0502020204030204" pitchFamily="34" charset="0"/>
-              <a:cs typeface="Times New Roman" panose="02020603050405020304" pitchFamily="18" charset="0"/>
-            </a:endParaRPr>
-          </a:p>
-          <a:p>
-            <a:endParaRPr lang="en-US" sz="2400" dirty="0"/>
-          </a:p>
         </p:txBody>
       </p:sp>
       <p:pic>
         <p:nvPicPr>
-          <p:cNvPr id="5" name="image10.png">
+          <p:cNvPr id="7" name="Picture 6">
             <a:extLst>
               <a:ext uri="{FF2B5EF4-FFF2-40B4-BE49-F238E27FC236}">
-                <a16:creationId xmlns:a16="http://schemas.microsoft.com/office/drawing/2014/main" id="{C3F2E36F-DBEF-0CAA-6C92-ECB0B05AE25B}"/>
+                <a16:creationId xmlns:a16="http://schemas.microsoft.com/office/drawing/2014/main" id="{8A12F6D9-C7E5-9AB3-2C48-8D419334C760}"/>
               </a:ext>
             </a:extLst>
           </p:cNvPr>
           <p:cNvPicPr>
-            <a:picLocks noGrp="1" noChangeAspect="1"/>
+            <a:picLocks noChangeAspect="1"/>
           </p:cNvPicPr>
-          <p:nvPr>
-            <p:ph sz="half" idx="3"/>
-          </p:nvPr>
+          <p:nvPr/>
         </p:nvPicPr>
         <p:blipFill>
-          <a:blip r:embed="rId2" cstate="print"/>
+          <a:blip r:embed="rId2"/>
           <a:stretch>
             <a:fillRect/>
           </a:stretch>
         </p:blipFill>
         <p:spPr>
           <a:xfrm>
-            <a:off x="6278882" y="1066800"/>
-            <a:ext cx="5455917" cy="5164304"/>
+            <a:off x="6278563" y="1219200"/>
+            <a:ext cx="5303837" cy="4884738"/>
           </a:xfrm>
           <a:prstGeom prst="rect">
             <a:avLst/>
@@ -3312,112 +2740,58 @@
       </p:pic>
       <p:sp>
         <p:nvSpPr>
-          <p:cNvPr id="6" name="Content Placeholder 6">
+          <p:cNvPr id="8" name="AutoShape 6">
             <a:extLst>
               <a:ext uri="{FF2B5EF4-FFF2-40B4-BE49-F238E27FC236}">
-                <a16:creationId xmlns:a16="http://schemas.microsoft.com/office/drawing/2014/main" id="{7440C33C-858A-8A67-1C5D-D45B7D309316}"/>
+                <a16:creationId xmlns:a16="http://schemas.microsoft.com/office/drawing/2014/main" id="{CEAA1D11-64FE-F8BC-966D-E68B0EE67D2F}"/>
               </a:ext>
             </a:extLst>
           </p:cNvPr>
-          <p:cNvSpPr txBox="1">
-            <a:spLocks/>
+          <p:cNvSpPr>
+            <a:spLocks noGrp="1" noChangeAspect="1" noChangeArrowheads="1"/>
           </p:cNvSpPr>
-          <p:nvPr/>
+          <p:nvPr>
+            <p:ph sz="half" idx="3"/>
+          </p:nvPr>
         </p:nvSpPr>
-        <p:spPr>
+        <p:spPr bwMode="auto">
           <a:xfrm>
-            <a:off x="6278880" y="304800"/>
-            <a:ext cx="5760720" cy="762000"/>
+            <a:off x="6278563" y="608633"/>
+            <a:ext cx="5303837" cy="523220"/>
           </a:xfrm>
           <a:prstGeom prst="rect">
             <a:avLst/>
           </a:prstGeom>
+          <a:noFill/>
+          <a:extLst>
+            <a:ext uri="{909E8E84-426E-40DD-AFC4-6F175D3DCCD1}">
+              <a14:hiddenFill xmlns:a14="http://schemas.microsoft.com/office/drawing/2010/main">
+                <a:solidFill>
+                  <a:srgbClr val="FFFFFF"/>
+                </a:solidFill>
+              </a14:hiddenFill>
+            </a:ext>
+          </a:extLst>
         </p:spPr>
         <p:txBody>
-          <a:bodyPr wrap="square" lIns="0" tIns="0" rIns="0" bIns="0">
-            <a:spAutoFit/>
+          <a:bodyPr vert="horz" wrap="square" lIns="91440" tIns="45720" rIns="91440" bIns="45720" numCol="1" anchor="t" anchorCtr="0" compatLnSpc="1">
+            <a:prstTxWarp prst="textNoShape">
+              <a:avLst/>
+            </a:prstTxWarp>
           </a:bodyPr>
-          <a:lstStyle>
-            <a:lvl1pPr marL="0">
-              <a:defRPr sz="2800" b="0" i="0">
-                <a:solidFill>
-                  <a:schemeClr val="tx1"/>
-                </a:solidFill>
-                <a:latin typeface="Times New Roman"/>
-                <a:ea typeface="+mn-ea"/>
-                <a:cs typeface="Times New Roman"/>
-              </a:defRPr>
-            </a:lvl1pPr>
-            <a:lvl2pPr marL="457200">
-              <a:defRPr>
-                <a:latin typeface="+mn-lt"/>
-                <a:ea typeface="+mn-ea"/>
-                <a:cs typeface="+mn-cs"/>
-              </a:defRPr>
-            </a:lvl2pPr>
-            <a:lvl3pPr marL="914400">
-              <a:defRPr>
-                <a:latin typeface="+mn-lt"/>
-                <a:ea typeface="+mn-ea"/>
-                <a:cs typeface="+mn-cs"/>
-              </a:defRPr>
-            </a:lvl3pPr>
-            <a:lvl4pPr marL="1371600">
-              <a:defRPr>
-                <a:latin typeface="+mn-lt"/>
-                <a:ea typeface="+mn-ea"/>
-                <a:cs typeface="+mn-cs"/>
-              </a:defRPr>
-            </a:lvl4pPr>
-            <a:lvl5pPr marL="1828800">
-              <a:defRPr>
-                <a:latin typeface="+mn-lt"/>
-                <a:ea typeface="+mn-ea"/>
-                <a:cs typeface="+mn-cs"/>
-              </a:defRPr>
-            </a:lvl5pPr>
-            <a:lvl6pPr marL="2286000">
-              <a:defRPr>
-                <a:latin typeface="+mn-lt"/>
-                <a:ea typeface="+mn-ea"/>
-                <a:cs typeface="+mn-cs"/>
-              </a:defRPr>
-            </a:lvl6pPr>
-            <a:lvl7pPr marL="2743200">
-              <a:defRPr>
-                <a:latin typeface="+mn-lt"/>
-                <a:ea typeface="+mn-ea"/>
-                <a:cs typeface="+mn-cs"/>
-              </a:defRPr>
-            </a:lvl7pPr>
-            <a:lvl8pPr marL="3200400">
-              <a:defRPr>
-                <a:latin typeface="+mn-lt"/>
-                <a:ea typeface="+mn-ea"/>
-                <a:cs typeface="+mn-cs"/>
-              </a:defRPr>
-            </a:lvl8pPr>
-            <a:lvl9pPr marL="3657600">
-              <a:defRPr>
-                <a:latin typeface="+mn-lt"/>
-                <a:ea typeface="+mn-ea"/>
-                <a:cs typeface="+mn-cs"/>
-              </a:defRPr>
-            </a:lvl9pPr>
-          </a:lstStyle>
-          <a:p>
-            <a:r>
-              <a:rPr lang="en-US"/>
-              <a:t>Output:</a:t>
-            </a:r>
-            <a:endParaRPr lang="en-US" dirty="0"/>
+          <a:lstStyle/>
+          <a:p>
+            <a:r>
+              <a:rPr lang="en-US" b="1" dirty="0"/>
+              <a:t>UI Validation Form:</a:t>
+            </a:r>
           </a:p>
         </p:txBody>
       </p:sp>
     </p:spTree>
     <p:extLst>
       <p:ext uri="{BB962C8B-B14F-4D97-AF65-F5344CB8AC3E}">
-        <p14:creationId xmlns:p14="http://schemas.microsoft.com/office/powerpoint/2010/main" val="1689241320"/>
+        <p14:creationId xmlns:p14="http://schemas.microsoft.com/office/powerpoint/2010/main" val="3263447098"/>
       </p:ext>
     </p:extLst>
   </p:cSld>
@@ -3427,256 +2801,7 @@
 </p:sld>
 </file>
 
-<file path=ppt/slides/slide13.xml><?xml version="1.0" encoding="utf-8"?>
-<p:sld xmlns:a="http://schemas.openxmlformats.org/drawingml/2006/main" xmlns:r="http://schemas.openxmlformats.org/officeDocument/2006/relationships" xmlns:p="http://schemas.openxmlformats.org/presentationml/2006/main">
-  <p:cSld>
-    <p:spTree>
-      <p:nvGrpSpPr>
-        <p:cNvPr id="1" name=""/>
-        <p:cNvGrpSpPr/>
-        <p:nvPr/>
-      </p:nvGrpSpPr>
-      <p:grpSpPr>
-        <a:xfrm>
-          <a:off x="0" y="0"/>
-          <a:ext cx="0" cy="0"/>
-          <a:chOff x="0" y="0"/>
-          <a:chExt cx="0" cy="0"/>
-        </a:xfrm>
-      </p:grpSpPr>
-      <p:sp>
-        <p:nvSpPr>
-          <p:cNvPr id="2" name="Title 1">
-            <a:extLst>
-              <a:ext uri="{FF2B5EF4-FFF2-40B4-BE49-F238E27FC236}">
-                <a16:creationId xmlns:a16="http://schemas.microsoft.com/office/drawing/2014/main" id="{712D9F0F-BF83-1F6B-09F3-0C3A3978C408}"/>
-              </a:ext>
-            </a:extLst>
-          </p:cNvPr>
-          <p:cNvSpPr>
-            <a:spLocks noGrp="1"/>
-          </p:cNvSpPr>
-          <p:nvPr>
-            <p:ph type="title"/>
-          </p:nvPr>
-        </p:nvSpPr>
-        <p:spPr/>
-        <p:txBody>
-          <a:bodyPr/>
-          <a:lstStyle/>
-          <a:p>
-            <a:r>
-              <a:rPr lang="en-US" dirty="0">
-                <a:latin typeface="Times New Roman" panose="02020603050405020304" pitchFamily="18" charset="0"/>
-                <a:cs typeface="Times New Roman" panose="02020603050405020304" pitchFamily="18" charset="0"/>
-              </a:rPr>
-              <a:t>Data</a:t>
-            </a:r>
-            <a:r>
-              <a:rPr lang="en-US" dirty="0"/>
-              <a:t> Cleaning</a:t>
-            </a:r>
-          </a:p>
-        </p:txBody>
-      </p:sp>
-      <p:sp>
-        <p:nvSpPr>
-          <p:cNvPr id="3" name="Text Placeholder 2">
-            <a:extLst>
-              <a:ext uri="{FF2B5EF4-FFF2-40B4-BE49-F238E27FC236}">
-                <a16:creationId xmlns:a16="http://schemas.microsoft.com/office/drawing/2014/main" id="{D3E7728E-0619-0BD8-D51D-99738FEE3D20}"/>
-              </a:ext>
-            </a:extLst>
-          </p:cNvPr>
-          <p:cNvSpPr>
-            <a:spLocks noGrp="1"/>
-          </p:cNvSpPr>
-          <p:nvPr>
-            <p:ph type="body" idx="1"/>
-          </p:nvPr>
-        </p:nvSpPr>
-        <p:spPr>
-          <a:xfrm>
-            <a:off x="746397" y="1392390"/>
-            <a:ext cx="10479133" cy="4818820"/>
-          </a:xfrm>
-        </p:spPr>
-        <p:txBody>
-          <a:bodyPr/>
-          <a:lstStyle/>
-          <a:p>
-            <a:pPr>
-              <a:lnSpc>
-                <a:spcPct val="107000"/>
-              </a:lnSpc>
-              <a:spcAft>
-                <a:spcPts val="800"/>
-              </a:spcAft>
-            </a:pPr>
-            <a:r>
-              <a:rPr lang="en-US" sz="2400" kern="100" dirty="0">
-                <a:effectLst/>
-                <a:latin typeface="Times New Roman" panose="02020603050405020304" pitchFamily="18" charset="0"/>
-                <a:ea typeface="Calibri" panose="020F0502020204030204" pitchFamily="34" charset="0"/>
-                <a:cs typeface="Times New Roman" panose="02020603050405020304" pitchFamily="18" charset="0"/>
-              </a:rPr>
-              <a:t>We performed the data cleaning using following steps:</a:t>
-            </a:r>
-            <a:endParaRPr lang="en-IN" sz="2400" kern="100" dirty="0">
-              <a:effectLst/>
-              <a:latin typeface="Times New Roman" panose="02020603050405020304" pitchFamily="18" charset="0"/>
-              <a:ea typeface="Calibri" panose="020F0502020204030204" pitchFamily="34" charset="0"/>
-              <a:cs typeface="Times New Roman" panose="02020603050405020304" pitchFamily="18" charset="0"/>
-            </a:endParaRPr>
-          </a:p>
-          <a:p>
-            <a:pPr marL="342900" lvl="0" indent="-342900">
-              <a:lnSpc>
-                <a:spcPct val="107000"/>
-              </a:lnSpc>
-              <a:buFont typeface="Symbol" pitchFamily="2" charset="2"/>
-              <a:buChar char=""/>
-            </a:pPr>
-            <a:r>
-              <a:rPr lang="en-US" sz="2400" b="1" u="sng" kern="100" dirty="0">
-                <a:effectLst/>
-                <a:latin typeface="Times New Roman" panose="02020603050405020304" pitchFamily="18" charset="0"/>
-                <a:ea typeface="Calibri" panose="020F0502020204030204" pitchFamily="34" charset="0"/>
-                <a:cs typeface="Times New Roman" panose="02020603050405020304" pitchFamily="18" charset="0"/>
-              </a:rPr>
-              <a:t>Duplicates</a:t>
-            </a:r>
-            <a:r>
-              <a:rPr lang="en-US" sz="2400" kern="100" dirty="0">
-                <a:effectLst/>
-                <a:latin typeface="Times New Roman" panose="02020603050405020304" pitchFamily="18" charset="0"/>
-                <a:ea typeface="Calibri" panose="020F0502020204030204" pitchFamily="34" charset="0"/>
-                <a:cs typeface="Times New Roman" panose="02020603050405020304" pitchFamily="18" charset="0"/>
-              </a:rPr>
-              <a:t>: Duplicates can be classified into two types, that is exact and near duplicates. The exact duplicates are easier to identify as they are the same values.  Near duplicates are the result of formatting, missing values, etc. </a:t>
-            </a:r>
-            <a:endParaRPr lang="en-IN" sz="2400" kern="100" dirty="0">
-              <a:effectLst/>
-              <a:latin typeface="Times New Roman" panose="02020603050405020304" pitchFamily="18" charset="0"/>
-              <a:ea typeface="Calibri" panose="020F0502020204030204" pitchFamily="34" charset="0"/>
-              <a:cs typeface="Times New Roman" panose="02020603050405020304" pitchFamily="18" charset="0"/>
-            </a:endParaRPr>
-          </a:p>
-          <a:p>
-            <a:pPr marL="342900" lvl="0" indent="-342900">
-              <a:lnSpc>
-                <a:spcPct val="107000"/>
-              </a:lnSpc>
-              <a:buFont typeface="Symbol" pitchFamily="2" charset="2"/>
-              <a:buChar char=""/>
-            </a:pPr>
-            <a:r>
-              <a:rPr lang="en-US" sz="2400" b="1" u="sng" kern="100" dirty="0">
-                <a:effectLst/>
-                <a:latin typeface="Times New Roman" panose="02020603050405020304" pitchFamily="18" charset="0"/>
-                <a:ea typeface="Calibri" panose="020F0502020204030204" pitchFamily="34" charset="0"/>
-                <a:cs typeface="Times New Roman" panose="02020603050405020304" pitchFamily="18" charset="0"/>
-              </a:rPr>
-              <a:t>Null</a:t>
-            </a:r>
-            <a:r>
-              <a:rPr lang="en-US" sz="2400" kern="100" dirty="0">
-                <a:effectLst/>
-                <a:latin typeface="Times New Roman" panose="02020603050405020304" pitchFamily="18" charset="0"/>
-                <a:ea typeface="Calibri" panose="020F0502020204030204" pitchFamily="34" charset="0"/>
-                <a:cs typeface="Times New Roman" panose="02020603050405020304" pitchFamily="18" charset="0"/>
-              </a:rPr>
-              <a:t>: The best way to remove the null values in the dataset is to either delete it or perform imputation. </a:t>
-            </a:r>
-            <a:endParaRPr lang="en-IN" sz="2400" kern="100" dirty="0">
-              <a:effectLst/>
-              <a:latin typeface="Times New Roman" panose="02020603050405020304" pitchFamily="18" charset="0"/>
-              <a:ea typeface="Calibri" panose="020F0502020204030204" pitchFamily="34" charset="0"/>
-              <a:cs typeface="Times New Roman" panose="02020603050405020304" pitchFamily="18" charset="0"/>
-            </a:endParaRPr>
-          </a:p>
-          <a:p>
-            <a:pPr marL="342900" lvl="0" indent="-342900">
-              <a:lnSpc>
-                <a:spcPct val="107000"/>
-              </a:lnSpc>
-              <a:buFont typeface="Symbol" pitchFamily="2" charset="2"/>
-              <a:buChar char=""/>
-            </a:pPr>
-            <a:r>
-              <a:rPr lang="en-US" sz="2400" b="1" u="sng" kern="100" dirty="0">
-                <a:effectLst/>
-                <a:latin typeface="Times New Roman" panose="02020603050405020304" pitchFamily="18" charset="0"/>
-                <a:ea typeface="Calibri" panose="020F0502020204030204" pitchFamily="34" charset="0"/>
-                <a:cs typeface="Times New Roman" panose="02020603050405020304" pitchFamily="18" charset="0"/>
-              </a:rPr>
-              <a:t>NA records: </a:t>
-            </a:r>
-            <a:r>
-              <a:rPr lang="en-US" sz="2400" kern="100" dirty="0">
-                <a:effectLst/>
-                <a:latin typeface="Times New Roman" panose="02020603050405020304" pitchFamily="18" charset="0"/>
-                <a:ea typeface="Calibri" panose="020F0502020204030204" pitchFamily="34" charset="0"/>
-                <a:cs typeface="Times New Roman" panose="02020603050405020304" pitchFamily="18" charset="0"/>
-              </a:rPr>
-              <a:t>The best way to deal with the NA records is similar to handling of null record, that is either we delete the missing data rows or impute a value in place of the NA value .</a:t>
-            </a:r>
-          </a:p>
-          <a:p>
-            <a:pPr marL="342900" lvl="0" indent="-342900">
-              <a:lnSpc>
-                <a:spcPct val="107000"/>
-              </a:lnSpc>
-              <a:buFont typeface="Symbol" pitchFamily="2" charset="2"/>
-              <a:buChar char=""/>
-            </a:pPr>
-            <a:r>
-              <a:rPr lang="en-US" sz="2400" b="1" u="sng" kern="100" dirty="0">
-                <a:effectLst/>
-                <a:latin typeface="Times New Roman" panose="02020603050405020304" pitchFamily="18" charset="0"/>
-                <a:ea typeface="Calibri" panose="020F0502020204030204" pitchFamily="34" charset="0"/>
-                <a:cs typeface="Times New Roman" panose="02020603050405020304" pitchFamily="18" charset="0"/>
-              </a:rPr>
-              <a:t>Empty records</a:t>
-            </a:r>
-            <a:r>
-              <a:rPr lang="en-US" sz="2400" kern="100" dirty="0">
-                <a:effectLst/>
-                <a:latin typeface="Times New Roman" panose="02020603050405020304" pitchFamily="18" charset="0"/>
-                <a:ea typeface="Calibri" panose="020F0502020204030204" pitchFamily="34" charset="0"/>
-                <a:cs typeface="Times New Roman" panose="02020603050405020304" pitchFamily="18" charset="0"/>
-              </a:rPr>
-              <a:t>: The handling of empty records in a dataset is the same as we handle null records.</a:t>
-            </a:r>
-            <a:endParaRPr lang="en-IN" sz="2400" kern="100" dirty="0">
-              <a:effectLst/>
-              <a:latin typeface="Times New Roman" panose="02020603050405020304" pitchFamily="18" charset="0"/>
-              <a:ea typeface="Calibri" panose="020F0502020204030204" pitchFamily="34" charset="0"/>
-              <a:cs typeface="Times New Roman" panose="02020603050405020304" pitchFamily="18" charset="0"/>
-            </a:endParaRPr>
-          </a:p>
-          <a:p>
-            <a:endParaRPr lang="en-US" sz="2400" dirty="0">
-              <a:latin typeface="Times New Roman" panose="02020603050405020304" pitchFamily="18" charset="0"/>
-              <a:cs typeface="Times New Roman" panose="02020603050405020304" pitchFamily="18" charset="0"/>
-            </a:endParaRPr>
-          </a:p>
-        </p:txBody>
-      </p:sp>
-    </p:spTree>
-    <p:extLst>
-      <p:ext uri="{BB962C8B-B14F-4D97-AF65-F5344CB8AC3E}">
-        <p14:creationId xmlns:p14="http://schemas.microsoft.com/office/powerpoint/2010/main" val="1657495668"/>
-      </p:ext>
-    </p:extLst>
-  </p:cSld>
-  <p:clrMapOvr>
-    <a:masterClrMapping/>
-  </p:clrMapOvr>
-</p:sld>
-</file>
-
-<file path=ppt/slides/slide14.xml><?xml version="1.0" encoding="utf-8"?>
+<file path=ppt/slides/slide11.xml><?xml version="1.0" encoding="utf-8"?>
 <p:sld xmlns:a="http://schemas.openxmlformats.org/drawingml/2006/main" xmlns:r="http://schemas.openxmlformats.org/officeDocument/2006/relationships" xmlns:p="http://schemas.openxmlformats.org/presentationml/2006/main">
   <p:cSld>
     <p:spTree>
@@ -3838,7 +2963,7 @@
 </p:sld>
 </file>
 
-<file path=ppt/slides/slide15.xml><?xml version="1.0" encoding="utf-8"?>
+<file path=ppt/slides/slide12.xml><?xml version="1.0" encoding="utf-8"?>
 <p:sld xmlns:a="http://schemas.openxmlformats.org/drawingml/2006/main" xmlns:r="http://schemas.openxmlformats.org/officeDocument/2006/relationships" xmlns:p="http://schemas.openxmlformats.org/presentationml/2006/main">
   <p:cSld>
     <p:spTree>
@@ -3977,7 +3102,7 @@
 </p:sld>
 </file>
 
-<file path=ppt/slides/slide16.xml><?xml version="1.0" encoding="utf-8"?>
+<file path=ppt/slides/slide13.xml><?xml version="1.0" encoding="utf-8"?>
 <p:sld xmlns:a="http://schemas.openxmlformats.org/drawingml/2006/main" xmlns:r="http://schemas.openxmlformats.org/officeDocument/2006/relationships" xmlns:p="http://schemas.openxmlformats.org/presentationml/2006/main">
   <p:cSld>
     <p:spTree>
@@ -4090,6 +3215,979 @@
     <p:extLst>
       <p:ext uri="{BB962C8B-B14F-4D97-AF65-F5344CB8AC3E}">
         <p14:creationId xmlns:p14="http://schemas.microsoft.com/office/powerpoint/2010/main" val="2114470829"/>
+      </p:ext>
+    </p:extLst>
+  </p:cSld>
+  <p:clrMapOvr>
+    <a:masterClrMapping/>
+  </p:clrMapOvr>
+</p:sld>
+</file>
+
+<file path=ppt/slides/slide14.xml><?xml version="1.0" encoding="utf-8"?>
+<p:sld xmlns:a="http://schemas.openxmlformats.org/drawingml/2006/main" xmlns:r="http://schemas.openxmlformats.org/officeDocument/2006/relationships" xmlns:p="http://schemas.openxmlformats.org/presentationml/2006/main">
+  <p:cSld>
+    <p:spTree>
+      <p:nvGrpSpPr>
+        <p:cNvPr id="1" name=""/>
+        <p:cNvGrpSpPr/>
+        <p:nvPr/>
+      </p:nvGrpSpPr>
+      <p:grpSpPr>
+        <a:xfrm>
+          <a:off x="0" y="0"/>
+          <a:ext cx="0" cy="0"/>
+          <a:chOff x="0" y="0"/>
+          <a:chExt cx="0" cy="0"/>
+        </a:xfrm>
+      </p:grpSpPr>
+      <p:sp>
+        <p:nvSpPr>
+          <p:cNvPr id="2" name="Title 1">
+            <a:extLst>
+              <a:ext uri="{FF2B5EF4-FFF2-40B4-BE49-F238E27FC236}">
+                <a16:creationId xmlns:a16="http://schemas.microsoft.com/office/drawing/2014/main" id="{4754D45B-6D61-224A-447D-61E77A01B5F7}"/>
+              </a:ext>
+            </a:extLst>
+          </p:cNvPr>
+          <p:cNvSpPr>
+            <a:spLocks noGrp="1"/>
+          </p:cNvSpPr>
+          <p:nvPr>
+            <p:ph type="title"/>
+          </p:nvPr>
+        </p:nvSpPr>
+        <p:spPr>
+          <a:xfrm>
+            <a:off x="381000" y="175426"/>
+            <a:ext cx="5257800" cy="586574"/>
+          </a:xfrm>
+        </p:spPr>
+        <p:txBody>
+          <a:bodyPr/>
+          <a:lstStyle/>
+          <a:p>
+            <a:pPr algn="l"/>
+            <a:r>
+              <a:rPr lang="en-US" dirty="0"/>
+              <a:t>SPSS </a:t>
+            </a:r>
+            <a:r>
+              <a:rPr lang="en-IN" sz="3600" b="1" kern="0" dirty="0">
+                <a:effectLst/>
+                <a:latin typeface="Times New Roman" panose="02020603050405020304" pitchFamily="18" charset="0"/>
+                <a:ea typeface="Times New Roman" panose="02020603050405020304" pitchFamily="18" charset="0"/>
+                <a:cs typeface="Times New Roman" panose="02020603050405020304" pitchFamily="18" charset="0"/>
+              </a:rPr>
+              <a:t>REGRESSION:</a:t>
+            </a:r>
+            <a:br>
+              <a:rPr lang="en-IN" sz="3600" kern="100" dirty="0">
+                <a:effectLst/>
+                <a:latin typeface="Calibri" panose="020F0502020204030204" pitchFamily="34" charset="0"/>
+                <a:ea typeface="Calibri" panose="020F0502020204030204" pitchFamily="34" charset="0"/>
+                <a:cs typeface="Times New Roman" panose="02020603050405020304" pitchFamily="18" charset="0"/>
+              </a:rPr>
+            </a:br>
+            <a:endParaRPr lang="en-US" dirty="0"/>
+          </a:p>
+        </p:txBody>
+      </p:sp>
+      <p:sp>
+        <p:nvSpPr>
+          <p:cNvPr id="4" name="Subtitle 3">
+            <a:extLst>
+              <a:ext uri="{FF2B5EF4-FFF2-40B4-BE49-F238E27FC236}">
+                <a16:creationId xmlns:a16="http://schemas.microsoft.com/office/drawing/2014/main" id="{CF442A88-2C89-CBA9-437B-A4A599654F2E}"/>
+              </a:ext>
+            </a:extLst>
+          </p:cNvPr>
+          <p:cNvSpPr>
+            <a:spLocks noGrp="1"/>
+          </p:cNvSpPr>
+          <p:nvPr>
+            <p:ph sz="half" idx="2"/>
+          </p:nvPr>
+        </p:nvSpPr>
+        <p:spPr>
+          <a:xfrm>
+            <a:off x="304800" y="1066800"/>
+            <a:ext cx="5608320" cy="4818820"/>
+          </a:xfrm>
+        </p:spPr>
+        <p:txBody>
+          <a:bodyPr/>
+          <a:lstStyle/>
+          <a:p>
+            <a:pPr marL="342900" indent="-342900" algn="l">
+              <a:lnSpc>
+                <a:spcPct val="107000"/>
+              </a:lnSpc>
+              <a:buFont typeface="Wingdings" pitchFamily="2" charset="2"/>
+              <a:buChar char="Ø"/>
+            </a:pPr>
+            <a:r>
+              <a:rPr lang="en-IN" sz="2400" kern="0" dirty="0">
+                <a:effectLst/>
+                <a:latin typeface="Times New Roman" panose="02020603050405020304" pitchFamily="18" charset="0"/>
+                <a:ea typeface="Times New Roman" panose="02020603050405020304" pitchFamily="18" charset="0"/>
+                <a:cs typeface="Times New Roman" panose="02020603050405020304" pitchFamily="18" charset="0"/>
+              </a:rPr>
+              <a:t>The </a:t>
+            </a:r>
+            <a:r>
+              <a:rPr lang="en-IN" sz="2400" kern="0" dirty="0" err="1">
+                <a:effectLst/>
+                <a:latin typeface="Times New Roman" panose="02020603050405020304" pitchFamily="18" charset="0"/>
+                <a:ea typeface="Times New Roman" panose="02020603050405020304" pitchFamily="18" charset="0"/>
+                <a:cs typeface="Times New Roman" panose="02020603050405020304" pitchFamily="18" charset="0"/>
+              </a:rPr>
+              <a:t>spss</a:t>
+            </a:r>
+            <a:r>
+              <a:rPr lang="en-IN" sz="2400" kern="0" dirty="0">
+                <a:effectLst/>
+                <a:latin typeface="Times New Roman" panose="02020603050405020304" pitchFamily="18" charset="0"/>
+                <a:ea typeface="Times New Roman" panose="02020603050405020304" pitchFamily="18" charset="0"/>
+                <a:cs typeface="Times New Roman" panose="02020603050405020304" pitchFamily="18" charset="0"/>
+              </a:rPr>
+              <a:t> for liner regression is done for the diabetes dataset.</a:t>
+            </a:r>
+            <a:endParaRPr lang="en-IN" sz="2400" kern="100" dirty="0">
+              <a:effectLst/>
+              <a:latin typeface="Calibri" panose="020F0502020204030204" pitchFamily="34" charset="0"/>
+              <a:ea typeface="Times New Roman" panose="02020603050405020304" pitchFamily="18" charset="0"/>
+              <a:cs typeface="Times New Roman" panose="02020603050405020304" pitchFamily="18" charset="0"/>
+            </a:endParaRPr>
+          </a:p>
+          <a:p>
+            <a:pPr marL="342900" lvl="0" indent="-342900" algn="l">
+              <a:lnSpc>
+                <a:spcPct val="107000"/>
+              </a:lnSpc>
+              <a:buFont typeface="Wingdings" pitchFamily="2" charset="2"/>
+              <a:buChar char="Ø"/>
+            </a:pPr>
+            <a:r>
+              <a:rPr lang="en-IN" sz="2400" kern="0" dirty="0">
+                <a:effectLst/>
+                <a:latin typeface="Times New Roman" panose="02020603050405020304" pitchFamily="18" charset="0"/>
+                <a:ea typeface="Times New Roman" panose="02020603050405020304" pitchFamily="18" charset="0"/>
+                <a:cs typeface="Times New Roman" panose="02020603050405020304" pitchFamily="18" charset="0"/>
+              </a:rPr>
+              <a:t>Here the dependent variable is Diabetes and the independent variable is hypertension, </a:t>
+            </a:r>
+            <a:r>
+              <a:rPr lang="en-IN" sz="2400" kern="0" dirty="0" err="1">
+                <a:effectLst/>
+                <a:latin typeface="Times New Roman" panose="02020603050405020304" pitchFamily="18" charset="0"/>
+                <a:ea typeface="Times New Roman" panose="02020603050405020304" pitchFamily="18" charset="0"/>
+                <a:cs typeface="Times New Roman" panose="02020603050405020304" pitchFamily="18" charset="0"/>
+              </a:rPr>
+              <a:t>blood_glucose_level</a:t>
+            </a:r>
+            <a:r>
+              <a:rPr lang="en-IN" sz="2400" kern="0" dirty="0">
+                <a:effectLst/>
+                <a:latin typeface="Times New Roman" panose="02020603050405020304" pitchFamily="18" charset="0"/>
+                <a:ea typeface="Times New Roman" panose="02020603050405020304" pitchFamily="18" charset="0"/>
+                <a:cs typeface="Times New Roman" panose="02020603050405020304" pitchFamily="18" charset="0"/>
+              </a:rPr>
+              <a:t>, </a:t>
+            </a:r>
+            <a:r>
+              <a:rPr lang="en-IN" sz="2400" kern="0" dirty="0" err="1">
+                <a:effectLst/>
+                <a:latin typeface="Times New Roman" panose="02020603050405020304" pitchFamily="18" charset="0"/>
+                <a:ea typeface="Times New Roman" panose="02020603050405020304" pitchFamily="18" charset="0"/>
+                <a:cs typeface="Times New Roman" panose="02020603050405020304" pitchFamily="18" charset="0"/>
+              </a:rPr>
+              <a:t>bmi^b</a:t>
+            </a:r>
+            <a:r>
+              <a:rPr lang="en-IN" sz="2400" kern="0" dirty="0">
+                <a:effectLst/>
+                <a:latin typeface="Times New Roman" panose="02020603050405020304" pitchFamily="18" charset="0"/>
+                <a:ea typeface="Times New Roman" panose="02020603050405020304" pitchFamily="18" charset="0"/>
+                <a:cs typeface="Times New Roman" panose="02020603050405020304" pitchFamily="18" charset="0"/>
+              </a:rPr>
+              <a:t>.</a:t>
+            </a:r>
+            <a:endParaRPr lang="en-IN" sz="2400" kern="100" dirty="0">
+              <a:effectLst/>
+              <a:latin typeface="Calibri" panose="020F0502020204030204" pitchFamily="34" charset="0"/>
+              <a:ea typeface="Times New Roman" panose="02020603050405020304" pitchFamily="18" charset="0"/>
+              <a:cs typeface="Times New Roman" panose="02020603050405020304" pitchFamily="18" charset="0"/>
+            </a:endParaRPr>
+          </a:p>
+          <a:p>
+            <a:pPr marL="342900" lvl="0" indent="-342900" algn="l">
+              <a:lnSpc>
+                <a:spcPct val="107000"/>
+              </a:lnSpc>
+              <a:spcAft>
+                <a:spcPts val="800"/>
+              </a:spcAft>
+              <a:buFont typeface="Wingdings" pitchFamily="2" charset="2"/>
+              <a:buChar char="Ø"/>
+            </a:pPr>
+            <a:r>
+              <a:rPr lang="en-IN" sz="2400" kern="0" dirty="0">
+                <a:effectLst/>
+                <a:latin typeface="Times New Roman" panose="02020603050405020304" pitchFamily="18" charset="0"/>
+                <a:ea typeface="Times New Roman" panose="02020603050405020304" pitchFamily="18" charset="0"/>
+                <a:cs typeface="Times New Roman" panose="02020603050405020304" pitchFamily="18" charset="0"/>
+              </a:rPr>
+              <a:t>The ANOVA Table will decide if the model is significant or not. Here the Sig value &lt;0.05, then there is Linear Relationship between the independent and dependent variable, there is some random slope value.</a:t>
+            </a:r>
+          </a:p>
+          <a:p>
+            <a:pPr algn="l"/>
+            <a:endParaRPr lang="en-US" sz="2400" dirty="0"/>
+          </a:p>
+        </p:txBody>
+      </p:sp>
+      <p:sp>
+        <p:nvSpPr>
+          <p:cNvPr id="7" name="Content Placeholder 6">
+            <a:extLst>
+              <a:ext uri="{FF2B5EF4-FFF2-40B4-BE49-F238E27FC236}">
+                <a16:creationId xmlns:a16="http://schemas.microsoft.com/office/drawing/2014/main" id="{D8EED4DE-9734-3EB5-9267-7D5D6A3408E8}"/>
+              </a:ext>
+            </a:extLst>
+          </p:cNvPr>
+          <p:cNvSpPr>
+            <a:spLocks noGrp="1"/>
+          </p:cNvSpPr>
+          <p:nvPr>
+            <p:ph sz="half" idx="3"/>
+          </p:nvPr>
+        </p:nvSpPr>
+        <p:spPr>
+          <a:xfrm>
+            <a:off x="6278880" y="304800"/>
+            <a:ext cx="5760720" cy="762000"/>
+          </a:xfrm>
+        </p:spPr>
+        <p:txBody>
+          <a:bodyPr/>
+          <a:lstStyle/>
+          <a:p>
+            <a:r>
+              <a:rPr lang="en-US" dirty="0"/>
+              <a:t>Output:</a:t>
+            </a:r>
+          </a:p>
+        </p:txBody>
+      </p:sp>
+      <p:pic>
+        <p:nvPicPr>
+          <p:cNvPr id="8" name="image9.png">
+            <a:extLst>
+              <a:ext uri="{FF2B5EF4-FFF2-40B4-BE49-F238E27FC236}">
+                <a16:creationId xmlns:a16="http://schemas.microsoft.com/office/drawing/2014/main" id="{A7DA67F6-A9B6-0073-9BCF-308A5574D1EA}"/>
+              </a:ext>
+            </a:extLst>
+          </p:cNvPr>
+          <p:cNvPicPr>
+            <a:picLocks noChangeAspect="1"/>
+          </p:cNvPicPr>
+          <p:nvPr/>
+        </p:nvPicPr>
+        <p:blipFill>
+          <a:blip r:embed="rId2" cstate="print"/>
+          <a:stretch>
+            <a:fillRect/>
+          </a:stretch>
+        </p:blipFill>
+        <p:spPr>
+          <a:xfrm>
+            <a:off x="6278880" y="1066800"/>
+            <a:ext cx="5608320" cy="5486400"/>
+          </a:xfrm>
+          <a:prstGeom prst="rect">
+            <a:avLst/>
+          </a:prstGeom>
+        </p:spPr>
+      </p:pic>
+    </p:spTree>
+    <p:extLst>
+      <p:ext uri="{BB962C8B-B14F-4D97-AF65-F5344CB8AC3E}">
+        <p14:creationId xmlns:p14="http://schemas.microsoft.com/office/powerpoint/2010/main" val="2183717736"/>
+      </p:ext>
+    </p:extLst>
+  </p:cSld>
+  <p:clrMapOvr>
+    <a:masterClrMapping/>
+  </p:clrMapOvr>
+</p:sld>
+</file>
+
+<file path=ppt/slides/slide15.xml><?xml version="1.0" encoding="utf-8"?>
+<p:sld xmlns:a="http://schemas.openxmlformats.org/drawingml/2006/main" xmlns:r="http://schemas.openxmlformats.org/officeDocument/2006/relationships" xmlns:p="http://schemas.openxmlformats.org/presentationml/2006/main">
+  <p:cSld>
+    <p:spTree>
+      <p:nvGrpSpPr>
+        <p:cNvPr id="1" name=""/>
+        <p:cNvGrpSpPr/>
+        <p:nvPr/>
+      </p:nvGrpSpPr>
+      <p:grpSpPr>
+        <a:xfrm>
+          <a:off x="0" y="0"/>
+          <a:ext cx="0" cy="0"/>
+          <a:chOff x="0" y="0"/>
+          <a:chExt cx="0" cy="0"/>
+        </a:xfrm>
+      </p:grpSpPr>
+      <p:sp>
+        <p:nvSpPr>
+          <p:cNvPr id="2" name="Title 1">
+            <a:extLst>
+              <a:ext uri="{FF2B5EF4-FFF2-40B4-BE49-F238E27FC236}">
+                <a16:creationId xmlns:a16="http://schemas.microsoft.com/office/drawing/2014/main" id="{F5317CE7-607C-DAB5-6711-FEF2D2562A24}"/>
+              </a:ext>
+            </a:extLst>
+          </p:cNvPr>
+          <p:cNvSpPr>
+            <a:spLocks noGrp="1"/>
+          </p:cNvSpPr>
+          <p:nvPr>
+            <p:ph type="title"/>
+          </p:nvPr>
+        </p:nvSpPr>
+        <p:spPr>
+          <a:xfrm>
+            <a:off x="756074" y="626896"/>
+            <a:ext cx="3434926" cy="668504"/>
+          </a:xfrm>
+        </p:spPr>
+        <p:txBody>
+          <a:bodyPr/>
+          <a:lstStyle/>
+          <a:p>
+            <a:r>
+              <a:rPr lang="en-IN" b="1" kern="0" dirty="0">
+                <a:effectLst/>
+                <a:latin typeface="Times New Roman" panose="02020603050405020304" pitchFamily="18" charset="0"/>
+                <a:ea typeface="Times New Roman" panose="02020603050405020304" pitchFamily="18" charset="0"/>
+                <a:cs typeface="Times New Roman" panose="02020603050405020304" pitchFamily="18" charset="0"/>
+              </a:rPr>
+              <a:t>CO-RELATION</a:t>
+            </a:r>
+            <a:br>
+              <a:rPr lang="en-IN" kern="100" dirty="0">
+                <a:effectLst/>
+                <a:latin typeface="Calibri" panose="020F0502020204030204" pitchFamily="34" charset="0"/>
+                <a:ea typeface="Calibri" panose="020F0502020204030204" pitchFamily="34" charset="0"/>
+                <a:cs typeface="Times New Roman" panose="02020603050405020304" pitchFamily="18" charset="0"/>
+              </a:rPr>
+            </a:br>
+            <a:endParaRPr lang="en-US" dirty="0"/>
+          </a:p>
+        </p:txBody>
+      </p:sp>
+      <p:sp>
+        <p:nvSpPr>
+          <p:cNvPr id="3" name="Content Placeholder 2">
+            <a:extLst>
+              <a:ext uri="{FF2B5EF4-FFF2-40B4-BE49-F238E27FC236}">
+                <a16:creationId xmlns:a16="http://schemas.microsoft.com/office/drawing/2014/main" id="{AC1E53E2-9F12-C1BA-DEA4-4D10ECE8D7E4}"/>
+              </a:ext>
+            </a:extLst>
+          </p:cNvPr>
+          <p:cNvSpPr>
+            <a:spLocks noGrp="1"/>
+          </p:cNvSpPr>
+          <p:nvPr>
+            <p:ph sz="half" idx="2"/>
+          </p:nvPr>
+        </p:nvSpPr>
+        <p:spPr>
+          <a:xfrm>
+            <a:off x="609600" y="1295400"/>
+            <a:ext cx="5303520" cy="4028475"/>
+          </a:xfrm>
+        </p:spPr>
+        <p:txBody>
+          <a:bodyPr/>
+          <a:lstStyle/>
+          <a:p>
+            <a:pPr lvl="0">
+              <a:lnSpc>
+                <a:spcPct val="107000"/>
+              </a:lnSpc>
+            </a:pPr>
+            <a:endParaRPr lang="en-IN" sz="2400" kern="0" dirty="0">
+              <a:effectLst/>
+              <a:latin typeface="Times New Roman" panose="02020603050405020304" pitchFamily="18" charset="0"/>
+              <a:ea typeface="Times New Roman" panose="02020603050405020304" pitchFamily="18" charset="0"/>
+              <a:cs typeface="Times New Roman" panose="02020603050405020304" pitchFamily="18" charset="0"/>
+            </a:endParaRPr>
+          </a:p>
+          <a:p>
+            <a:pPr marL="342900" lvl="0" indent="-342900">
+              <a:lnSpc>
+                <a:spcPct val="107000"/>
+              </a:lnSpc>
+              <a:buFont typeface="Wingdings" pitchFamily="2" charset="2"/>
+              <a:buChar char="Ø"/>
+            </a:pPr>
+            <a:r>
+              <a:rPr lang="en-IN" sz="2400" kern="0" dirty="0">
+                <a:effectLst/>
+                <a:latin typeface="Times New Roman" panose="02020603050405020304" pitchFamily="18" charset="0"/>
+                <a:ea typeface="Times New Roman" panose="02020603050405020304" pitchFamily="18" charset="0"/>
+                <a:cs typeface="Times New Roman" panose="02020603050405020304" pitchFamily="18" charset="0"/>
+              </a:rPr>
+              <a:t>The Coefficient Box gives the linear equation. The Pearson Correlation value is 0.467 for 20% sample (Testing) and 0.478 for 80% of the Sample (Training). The values are nearly similar to each other. </a:t>
+            </a:r>
+            <a:endParaRPr lang="en-IN" sz="2400" kern="100" dirty="0">
+              <a:effectLst/>
+              <a:latin typeface="Calibri" panose="020F0502020204030204" pitchFamily="34" charset="0"/>
+              <a:ea typeface="Times New Roman" panose="02020603050405020304" pitchFamily="18" charset="0"/>
+              <a:cs typeface="Times New Roman" panose="02020603050405020304" pitchFamily="18" charset="0"/>
+            </a:endParaRPr>
+          </a:p>
+          <a:p>
+            <a:pPr marL="342900" lvl="0" indent="-342900">
+              <a:lnSpc>
+                <a:spcPct val="107000"/>
+              </a:lnSpc>
+              <a:spcAft>
+                <a:spcPts val="800"/>
+              </a:spcAft>
+              <a:buFont typeface="Wingdings" pitchFamily="2" charset="2"/>
+              <a:buChar char="Ø"/>
+            </a:pPr>
+            <a:r>
+              <a:rPr lang="en-IN" sz="2400" kern="0" dirty="0">
+                <a:effectLst/>
+                <a:latin typeface="Times New Roman" panose="02020603050405020304" pitchFamily="18" charset="0"/>
+                <a:ea typeface="Times New Roman" panose="02020603050405020304" pitchFamily="18" charset="0"/>
+                <a:cs typeface="Times New Roman" panose="02020603050405020304" pitchFamily="18" charset="0"/>
+              </a:rPr>
+              <a:t>Hence, we can conclude that our model is neither underfitting nor overfitting.</a:t>
+            </a:r>
+            <a:endParaRPr lang="en-IN" sz="2400" kern="100" dirty="0">
+              <a:effectLst/>
+              <a:latin typeface="Calibri" panose="020F0502020204030204" pitchFamily="34" charset="0"/>
+              <a:ea typeface="Times New Roman" panose="02020603050405020304" pitchFamily="18" charset="0"/>
+              <a:cs typeface="Times New Roman" panose="02020603050405020304" pitchFamily="18" charset="0"/>
+            </a:endParaRPr>
+          </a:p>
+          <a:p>
+            <a:endParaRPr lang="en-US" sz="2400" dirty="0"/>
+          </a:p>
+        </p:txBody>
+      </p:sp>
+      <p:pic>
+        <p:nvPicPr>
+          <p:cNvPr id="5" name="image11.png">
+            <a:extLst>
+              <a:ext uri="{FF2B5EF4-FFF2-40B4-BE49-F238E27FC236}">
+                <a16:creationId xmlns:a16="http://schemas.microsoft.com/office/drawing/2014/main" id="{965FEFFD-DCF8-C34A-CD2D-B42F82F0A9D8}"/>
+              </a:ext>
+            </a:extLst>
+          </p:cNvPr>
+          <p:cNvPicPr>
+            <a:picLocks noGrp="1" noChangeAspect="1"/>
+          </p:cNvPicPr>
+          <p:nvPr>
+            <p:ph sz="half" idx="3"/>
+          </p:nvPr>
+        </p:nvPicPr>
+        <p:blipFill>
+          <a:blip r:embed="rId2" cstate="print"/>
+          <a:stretch>
+            <a:fillRect/>
+          </a:stretch>
+        </p:blipFill>
+        <p:spPr>
+          <a:xfrm>
+            <a:off x="7086600" y="1295400"/>
+            <a:ext cx="4876799" cy="4953000"/>
+          </a:xfrm>
+          <a:prstGeom prst="rect">
+            <a:avLst/>
+          </a:prstGeom>
+        </p:spPr>
+      </p:pic>
+      <p:sp>
+        <p:nvSpPr>
+          <p:cNvPr id="6" name="Content Placeholder 6">
+            <a:extLst>
+              <a:ext uri="{FF2B5EF4-FFF2-40B4-BE49-F238E27FC236}">
+                <a16:creationId xmlns:a16="http://schemas.microsoft.com/office/drawing/2014/main" id="{720063F9-8F9B-CB1B-6E30-AAA86F3095DE}"/>
+              </a:ext>
+            </a:extLst>
+          </p:cNvPr>
+          <p:cNvSpPr txBox="1">
+            <a:spLocks/>
+          </p:cNvSpPr>
+          <p:nvPr/>
+        </p:nvSpPr>
+        <p:spPr>
+          <a:xfrm>
+            <a:off x="6934200" y="609600"/>
+            <a:ext cx="5105400" cy="430887"/>
+          </a:xfrm>
+          <a:prstGeom prst="rect">
+            <a:avLst/>
+          </a:prstGeom>
+        </p:spPr>
+        <p:txBody>
+          <a:bodyPr wrap="square" lIns="0" tIns="0" rIns="0" bIns="0">
+            <a:spAutoFit/>
+          </a:bodyPr>
+          <a:lstStyle>
+            <a:lvl1pPr marL="0">
+              <a:defRPr sz="2800" b="0" i="0">
+                <a:solidFill>
+                  <a:schemeClr val="tx1"/>
+                </a:solidFill>
+                <a:latin typeface="Times New Roman"/>
+                <a:ea typeface="+mn-ea"/>
+                <a:cs typeface="Times New Roman"/>
+              </a:defRPr>
+            </a:lvl1pPr>
+            <a:lvl2pPr marL="457200">
+              <a:defRPr>
+                <a:latin typeface="+mn-lt"/>
+                <a:ea typeface="+mn-ea"/>
+                <a:cs typeface="+mn-cs"/>
+              </a:defRPr>
+            </a:lvl2pPr>
+            <a:lvl3pPr marL="914400">
+              <a:defRPr>
+                <a:latin typeface="+mn-lt"/>
+                <a:ea typeface="+mn-ea"/>
+                <a:cs typeface="+mn-cs"/>
+              </a:defRPr>
+            </a:lvl3pPr>
+            <a:lvl4pPr marL="1371600">
+              <a:defRPr>
+                <a:latin typeface="+mn-lt"/>
+                <a:ea typeface="+mn-ea"/>
+                <a:cs typeface="+mn-cs"/>
+              </a:defRPr>
+            </a:lvl4pPr>
+            <a:lvl5pPr marL="1828800">
+              <a:defRPr>
+                <a:latin typeface="+mn-lt"/>
+                <a:ea typeface="+mn-ea"/>
+                <a:cs typeface="+mn-cs"/>
+              </a:defRPr>
+            </a:lvl5pPr>
+            <a:lvl6pPr marL="2286000">
+              <a:defRPr>
+                <a:latin typeface="+mn-lt"/>
+                <a:ea typeface="+mn-ea"/>
+                <a:cs typeface="+mn-cs"/>
+              </a:defRPr>
+            </a:lvl6pPr>
+            <a:lvl7pPr marL="2743200">
+              <a:defRPr>
+                <a:latin typeface="+mn-lt"/>
+                <a:ea typeface="+mn-ea"/>
+                <a:cs typeface="+mn-cs"/>
+              </a:defRPr>
+            </a:lvl7pPr>
+            <a:lvl8pPr marL="3200400">
+              <a:defRPr>
+                <a:latin typeface="+mn-lt"/>
+                <a:ea typeface="+mn-ea"/>
+                <a:cs typeface="+mn-cs"/>
+              </a:defRPr>
+            </a:lvl8pPr>
+            <a:lvl9pPr marL="3657600">
+              <a:defRPr>
+                <a:latin typeface="+mn-lt"/>
+                <a:ea typeface="+mn-ea"/>
+                <a:cs typeface="+mn-cs"/>
+              </a:defRPr>
+            </a:lvl9pPr>
+          </a:lstStyle>
+          <a:p>
+            <a:r>
+              <a:rPr lang="en-US" dirty="0"/>
+              <a:t>Output:</a:t>
+            </a:r>
+          </a:p>
+        </p:txBody>
+      </p:sp>
+    </p:spTree>
+    <p:extLst>
+      <p:ext uri="{BB962C8B-B14F-4D97-AF65-F5344CB8AC3E}">
+        <p14:creationId xmlns:p14="http://schemas.microsoft.com/office/powerpoint/2010/main" val="3278949528"/>
+      </p:ext>
+    </p:extLst>
+  </p:cSld>
+  <p:clrMapOvr>
+    <a:masterClrMapping/>
+  </p:clrMapOvr>
+</p:sld>
+</file>
+
+<file path=ppt/slides/slide16.xml><?xml version="1.0" encoding="utf-8"?>
+<p:sld xmlns:a="http://schemas.openxmlformats.org/drawingml/2006/main" xmlns:r="http://schemas.openxmlformats.org/officeDocument/2006/relationships" xmlns:p="http://schemas.openxmlformats.org/presentationml/2006/main">
+  <p:cSld>
+    <p:spTree>
+      <p:nvGrpSpPr>
+        <p:cNvPr id="1" name=""/>
+        <p:cNvGrpSpPr/>
+        <p:nvPr/>
+      </p:nvGrpSpPr>
+      <p:grpSpPr>
+        <a:xfrm>
+          <a:off x="0" y="0"/>
+          <a:ext cx="0" cy="0"/>
+          <a:chOff x="0" y="0"/>
+          <a:chExt cx="0" cy="0"/>
+        </a:xfrm>
+      </p:grpSpPr>
+      <p:sp>
+        <p:nvSpPr>
+          <p:cNvPr id="2" name="Title 1">
+            <a:extLst>
+              <a:ext uri="{FF2B5EF4-FFF2-40B4-BE49-F238E27FC236}">
+                <a16:creationId xmlns:a16="http://schemas.microsoft.com/office/drawing/2014/main" id="{A0B141B5-45A7-D50D-F507-5C0887501C8E}"/>
+              </a:ext>
+            </a:extLst>
+          </p:cNvPr>
+          <p:cNvSpPr>
+            <a:spLocks noGrp="1"/>
+          </p:cNvSpPr>
+          <p:nvPr>
+            <p:ph type="title"/>
+          </p:nvPr>
+        </p:nvSpPr>
+        <p:spPr/>
+        <p:txBody>
+          <a:bodyPr/>
+          <a:lstStyle/>
+          <a:p>
+            <a:r>
+              <a:rPr lang="en-US" dirty="0"/>
+              <a:t>T-test</a:t>
+            </a:r>
+          </a:p>
+        </p:txBody>
+      </p:sp>
+      <p:sp>
+        <p:nvSpPr>
+          <p:cNvPr id="3" name="Content Placeholder 2">
+            <a:extLst>
+              <a:ext uri="{FF2B5EF4-FFF2-40B4-BE49-F238E27FC236}">
+                <a16:creationId xmlns:a16="http://schemas.microsoft.com/office/drawing/2014/main" id="{0B1A201C-2D09-CE02-9C23-2D921D39DC4B}"/>
+              </a:ext>
+            </a:extLst>
+          </p:cNvPr>
+          <p:cNvSpPr>
+            <a:spLocks noGrp="1"/>
+          </p:cNvSpPr>
+          <p:nvPr>
+            <p:ph sz="half" idx="2"/>
+          </p:nvPr>
+        </p:nvSpPr>
+        <p:spPr>
+          <a:xfrm>
+            <a:off x="609600" y="1577340"/>
+            <a:ext cx="5303520" cy="5247590"/>
+          </a:xfrm>
+        </p:spPr>
+        <p:txBody>
+          <a:bodyPr/>
+          <a:lstStyle/>
+          <a:p>
+            <a:pPr marL="342900" lvl="0" indent="-342900">
+              <a:lnSpc>
+                <a:spcPct val="107000"/>
+              </a:lnSpc>
+              <a:buFont typeface="Wingdings" pitchFamily="2" charset="2"/>
+              <a:buChar char="Ø"/>
+            </a:pPr>
+            <a:r>
+              <a:rPr lang="en-IN" sz="2000" kern="0" dirty="0">
+                <a:effectLst/>
+                <a:latin typeface="Times New Roman" panose="02020603050405020304" pitchFamily="18" charset="0"/>
+                <a:ea typeface="Times New Roman" panose="02020603050405020304" pitchFamily="18" charset="0"/>
+                <a:cs typeface="Times New Roman" panose="02020603050405020304" pitchFamily="18" charset="0"/>
+              </a:rPr>
+              <a:t>The record for </a:t>
+            </a:r>
+            <a:r>
+              <a:rPr lang="en-IN" sz="2000" kern="0" dirty="0" err="1">
+                <a:effectLst/>
+                <a:latin typeface="Times New Roman" panose="02020603050405020304" pitchFamily="18" charset="0"/>
+                <a:ea typeface="Times New Roman" panose="02020603050405020304" pitchFamily="18" charset="0"/>
+                <a:cs typeface="Times New Roman" panose="02020603050405020304" pitchFamily="18" charset="0"/>
+              </a:rPr>
+              <a:t>blood_glucose_level</a:t>
+            </a:r>
+            <a:r>
+              <a:rPr lang="en-IN" sz="2000" kern="0" dirty="0">
+                <a:effectLst/>
+                <a:latin typeface="Times New Roman" panose="02020603050405020304" pitchFamily="18" charset="0"/>
+                <a:ea typeface="Times New Roman" panose="02020603050405020304" pitchFamily="18" charset="0"/>
+                <a:cs typeface="Times New Roman" panose="02020603050405020304" pitchFamily="18" charset="0"/>
+              </a:rPr>
+              <a:t> is </a:t>
+            </a:r>
+            <a:r>
+              <a:rPr lang="en-IN" sz="2000" kern="0" dirty="0" err="1">
+                <a:effectLst/>
+                <a:latin typeface="Times New Roman" panose="02020603050405020304" pitchFamily="18" charset="0"/>
+                <a:ea typeface="Times New Roman" panose="02020603050405020304" pitchFamily="18" charset="0"/>
+                <a:cs typeface="Times New Roman" panose="02020603050405020304" pitchFamily="18" charset="0"/>
+              </a:rPr>
+              <a:t>analyzed</a:t>
+            </a:r>
+            <a:r>
+              <a:rPr lang="en-IN" sz="2000" kern="0" dirty="0">
+                <a:effectLst/>
+                <a:latin typeface="Times New Roman" panose="02020603050405020304" pitchFamily="18" charset="0"/>
+                <a:ea typeface="Times New Roman" panose="02020603050405020304" pitchFamily="18" charset="0"/>
+                <a:cs typeface="Times New Roman" panose="02020603050405020304" pitchFamily="18" charset="0"/>
+              </a:rPr>
+              <a:t> for diabetes the values are for the group as 0 and 1 which is classified as a person with diabetes or not.</a:t>
+            </a:r>
+          </a:p>
+          <a:p>
+            <a:pPr marL="342900" lvl="0" indent="-342900">
+              <a:lnSpc>
+                <a:spcPct val="107000"/>
+              </a:lnSpc>
+              <a:buFont typeface="Wingdings" pitchFamily="2" charset="2"/>
+              <a:buChar char="Ø"/>
+            </a:pPr>
+            <a:r>
+              <a:rPr lang="en-IN" sz="2000" kern="0" dirty="0">
+                <a:effectLst/>
+                <a:latin typeface="Times New Roman" panose="02020603050405020304" pitchFamily="18" charset="0"/>
+                <a:ea typeface="Times New Roman" panose="02020603050405020304" pitchFamily="18" charset="0"/>
+                <a:cs typeface="Times New Roman" panose="02020603050405020304" pitchFamily="18" charset="0"/>
+              </a:rPr>
+              <a:t>In the Group statistics the values for mean, standard deviation and standard error mean and the number of patients for groups 0 and 1are taken.</a:t>
+            </a:r>
+          </a:p>
+          <a:p>
+            <a:pPr marL="342900" lvl="0" indent="-342900">
+              <a:lnSpc>
+                <a:spcPct val="107000"/>
+              </a:lnSpc>
+              <a:buFont typeface="Wingdings" pitchFamily="2" charset="2"/>
+              <a:buChar char="Ø"/>
+            </a:pPr>
+            <a:r>
+              <a:rPr lang="en-IN" sz="2000" kern="0" dirty="0">
+                <a:effectLst/>
+                <a:latin typeface="Times New Roman" panose="02020603050405020304" pitchFamily="18" charset="0"/>
+                <a:ea typeface="Times New Roman" panose="02020603050405020304" pitchFamily="18" charset="0"/>
+                <a:cs typeface="Times New Roman" panose="02020603050405020304" pitchFamily="18" charset="0"/>
+              </a:rPr>
+              <a:t>From the independent samples test table we get 'p-value'. The value of p is &lt;0.05 (alpha value) which depicts we can REJECT null-hypothesis.</a:t>
+            </a:r>
+          </a:p>
+          <a:p>
+            <a:pPr marL="342900" indent="-342900">
+              <a:lnSpc>
+                <a:spcPct val="107000"/>
+              </a:lnSpc>
+              <a:buFont typeface="Wingdings" pitchFamily="2" charset="2"/>
+              <a:buChar char="Ø"/>
+            </a:pPr>
+            <a:r>
+              <a:rPr lang="en-IN" sz="2000" kern="0" dirty="0">
+                <a:effectLst/>
+                <a:latin typeface="Times New Roman" panose="02020603050405020304" pitchFamily="18" charset="0"/>
+                <a:ea typeface="Times New Roman" panose="02020603050405020304" pitchFamily="18" charset="0"/>
+                <a:cs typeface="Times New Roman" panose="02020603050405020304" pitchFamily="18" charset="0"/>
+              </a:rPr>
+              <a:t>From the t-test analysis we conclude that the groups 0 and 1 are unlike</a:t>
+            </a:r>
+            <a:endParaRPr lang="en-IN" sz="2000" kern="100" dirty="0">
+              <a:effectLst/>
+              <a:latin typeface="Times New Roman" panose="02020603050405020304" pitchFamily="18" charset="0"/>
+              <a:ea typeface="Calibri" panose="020F0502020204030204" pitchFamily="34" charset="0"/>
+              <a:cs typeface="Times New Roman" panose="02020603050405020304" pitchFamily="18" charset="0"/>
+            </a:endParaRPr>
+          </a:p>
+          <a:p>
+            <a:pPr marL="342900" lvl="0" indent="-342900">
+              <a:lnSpc>
+                <a:spcPct val="107000"/>
+              </a:lnSpc>
+              <a:buFont typeface="Wingdings" pitchFamily="2" charset="2"/>
+              <a:buChar char="Ø"/>
+            </a:pPr>
+            <a:endParaRPr lang="en-IN" sz="2000" kern="100" dirty="0">
+              <a:effectLst/>
+              <a:latin typeface="Times New Roman" panose="02020603050405020304" pitchFamily="18" charset="0"/>
+              <a:ea typeface="Calibri" panose="020F0502020204030204" pitchFamily="34" charset="0"/>
+              <a:cs typeface="Times New Roman" panose="02020603050405020304" pitchFamily="18" charset="0"/>
+            </a:endParaRPr>
+          </a:p>
+          <a:p>
+            <a:pPr marL="342900" lvl="0" indent="-342900">
+              <a:lnSpc>
+                <a:spcPct val="107000"/>
+              </a:lnSpc>
+              <a:buFont typeface="Symbol" pitchFamily="2" charset="2"/>
+              <a:buChar char=""/>
+            </a:pPr>
+            <a:endParaRPr lang="en-IN" sz="2000" kern="100" dirty="0">
+              <a:effectLst/>
+              <a:latin typeface="Calibri" panose="020F0502020204030204" pitchFamily="34" charset="0"/>
+              <a:ea typeface="Calibri" panose="020F0502020204030204" pitchFamily="34" charset="0"/>
+              <a:cs typeface="Times New Roman" panose="02020603050405020304" pitchFamily="18" charset="0"/>
+            </a:endParaRPr>
+          </a:p>
+          <a:p>
+            <a:endParaRPr lang="en-US" sz="2000" dirty="0"/>
+          </a:p>
+        </p:txBody>
+      </p:sp>
+      <p:pic>
+        <p:nvPicPr>
+          <p:cNvPr id="5" name="image10.png">
+            <a:extLst>
+              <a:ext uri="{FF2B5EF4-FFF2-40B4-BE49-F238E27FC236}">
+                <a16:creationId xmlns:a16="http://schemas.microsoft.com/office/drawing/2014/main" id="{C3F2E36F-DBEF-0CAA-6C92-ECB0B05AE25B}"/>
+              </a:ext>
+            </a:extLst>
+          </p:cNvPr>
+          <p:cNvPicPr>
+            <a:picLocks noGrp="1" noChangeAspect="1"/>
+          </p:cNvPicPr>
+          <p:nvPr>
+            <p:ph sz="half" idx="3"/>
+          </p:nvPr>
+        </p:nvPicPr>
+        <p:blipFill>
+          <a:blip r:embed="rId2" cstate="print"/>
+          <a:stretch>
+            <a:fillRect/>
+          </a:stretch>
+        </p:blipFill>
+        <p:spPr>
+          <a:xfrm>
+            <a:off x="6278882" y="1066800"/>
+            <a:ext cx="5455917" cy="5164304"/>
+          </a:xfrm>
+          <a:prstGeom prst="rect">
+            <a:avLst/>
+          </a:prstGeom>
+        </p:spPr>
+      </p:pic>
+      <p:sp>
+        <p:nvSpPr>
+          <p:cNvPr id="6" name="Content Placeholder 6">
+            <a:extLst>
+              <a:ext uri="{FF2B5EF4-FFF2-40B4-BE49-F238E27FC236}">
+                <a16:creationId xmlns:a16="http://schemas.microsoft.com/office/drawing/2014/main" id="{7440C33C-858A-8A67-1C5D-D45B7D309316}"/>
+              </a:ext>
+            </a:extLst>
+          </p:cNvPr>
+          <p:cNvSpPr txBox="1">
+            <a:spLocks/>
+          </p:cNvSpPr>
+          <p:nvPr/>
+        </p:nvSpPr>
+        <p:spPr>
+          <a:xfrm>
+            <a:off x="6278880" y="304800"/>
+            <a:ext cx="5760720" cy="762000"/>
+          </a:xfrm>
+          <a:prstGeom prst="rect">
+            <a:avLst/>
+          </a:prstGeom>
+        </p:spPr>
+        <p:txBody>
+          <a:bodyPr wrap="square" lIns="0" tIns="0" rIns="0" bIns="0">
+            <a:spAutoFit/>
+          </a:bodyPr>
+          <a:lstStyle>
+            <a:lvl1pPr marL="0">
+              <a:defRPr sz="2800" b="0" i="0">
+                <a:solidFill>
+                  <a:schemeClr val="tx1"/>
+                </a:solidFill>
+                <a:latin typeface="Times New Roman"/>
+                <a:ea typeface="+mn-ea"/>
+                <a:cs typeface="Times New Roman"/>
+              </a:defRPr>
+            </a:lvl1pPr>
+            <a:lvl2pPr marL="457200">
+              <a:defRPr>
+                <a:latin typeface="+mn-lt"/>
+                <a:ea typeface="+mn-ea"/>
+                <a:cs typeface="+mn-cs"/>
+              </a:defRPr>
+            </a:lvl2pPr>
+            <a:lvl3pPr marL="914400">
+              <a:defRPr>
+                <a:latin typeface="+mn-lt"/>
+                <a:ea typeface="+mn-ea"/>
+                <a:cs typeface="+mn-cs"/>
+              </a:defRPr>
+            </a:lvl3pPr>
+            <a:lvl4pPr marL="1371600">
+              <a:defRPr>
+                <a:latin typeface="+mn-lt"/>
+                <a:ea typeface="+mn-ea"/>
+                <a:cs typeface="+mn-cs"/>
+              </a:defRPr>
+            </a:lvl4pPr>
+            <a:lvl5pPr marL="1828800">
+              <a:defRPr>
+                <a:latin typeface="+mn-lt"/>
+                <a:ea typeface="+mn-ea"/>
+                <a:cs typeface="+mn-cs"/>
+              </a:defRPr>
+            </a:lvl5pPr>
+            <a:lvl6pPr marL="2286000">
+              <a:defRPr>
+                <a:latin typeface="+mn-lt"/>
+                <a:ea typeface="+mn-ea"/>
+                <a:cs typeface="+mn-cs"/>
+              </a:defRPr>
+            </a:lvl6pPr>
+            <a:lvl7pPr marL="2743200">
+              <a:defRPr>
+                <a:latin typeface="+mn-lt"/>
+                <a:ea typeface="+mn-ea"/>
+                <a:cs typeface="+mn-cs"/>
+              </a:defRPr>
+            </a:lvl7pPr>
+            <a:lvl8pPr marL="3200400">
+              <a:defRPr>
+                <a:latin typeface="+mn-lt"/>
+                <a:ea typeface="+mn-ea"/>
+                <a:cs typeface="+mn-cs"/>
+              </a:defRPr>
+            </a:lvl8pPr>
+            <a:lvl9pPr marL="3657600">
+              <a:defRPr>
+                <a:latin typeface="+mn-lt"/>
+                <a:ea typeface="+mn-ea"/>
+                <a:cs typeface="+mn-cs"/>
+              </a:defRPr>
+            </a:lvl9pPr>
+          </a:lstStyle>
+          <a:p>
+            <a:r>
+              <a:rPr lang="en-US"/>
+              <a:t>Output:</a:t>
+            </a:r>
+            <a:endParaRPr lang="en-US" dirty="0"/>
+          </a:p>
+        </p:txBody>
+      </p:sp>
+    </p:spTree>
+    <p:extLst>
+      <p:ext uri="{BB962C8B-B14F-4D97-AF65-F5344CB8AC3E}">
+        <p14:creationId xmlns:p14="http://schemas.microsoft.com/office/powerpoint/2010/main" val="1689241320"/>
       </p:ext>
     </p:extLst>
   </p:cSld>
@@ -8281,7 +8379,7 @@
           <p:cNvPr id="2" name="Title 1">
             <a:extLst>
               <a:ext uri="{FF2B5EF4-FFF2-40B4-BE49-F238E27FC236}">
-                <a16:creationId xmlns:a16="http://schemas.microsoft.com/office/drawing/2014/main" id="{4B888448-3636-2843-C26F-ED81DE46CD90}"/>
+                <a16:creationId xmlns:a16="http://schemas.microsoft.com/office/drawing/2014/main" id="{712D9F0F-BF83-1F6B-09F3-0C3A3978C408}"/>
               </a:ext>
             </a:extLst>
           </p:cNvPr>
@@ -8302,18 +8400,21 @@
                 <a:latin typeface="Times New Roman" panose="02020603050405020304" pitchFamily="18" charset="0"/>
                 <a:cs typeface="Times New Roman" panose="02020603050405020304" pitchFamily="18" charset="0"/>
               </a:rPr>
-              <a:t>UI Validations:</a:t>
-            </a:r>
-            <a:endParaRPr lang="en-US" dirty="0"/>
+              <a:t>Data</a:t>
+            </a:r>
+            <a:r>
+              <a:rPr lang="en-US" dirty="0"/>
+              <a:t> Cleaning</a:t>
+            </a:r>
           </a:p>
         </p:txBody>
       </p:sp>
       <p:sp>
         <p:nvSpPr>
-          <p:cNvPr id="3" name="Content Placeholder 2">
+          <p:cNvPr id="3" name="Text Placeholder 2">
             <a:extLst>
               <a:ext uri="{FF2B5EF4-FFF2-40B4-BE49-F238E27FC236}">
-                <a16:creationId xmlns:a16="http://schemas.microsoft.com/office/drawing/2014/main" id="{8C9C8AB2-0C59-8764-6C30-21925CB6A2AA}"/>
+                <a16:creationId xmlns:a16="http://schemas.microsoft.com/office/drawing/2014/main" id="{D3E7728E-0619-0BD8-D51D-99738FEE3D20}"/>
               </a:ext>
             </a:extLst>
           </p:cNvPr>
@@ -8321,145 +8422,37 @@
             <a:spLocks noGrp="1"/>
           </p:cNvSpPr>
           <p:nvPr>
-            <p:ph sz="half" idx="2"/>
+            <p:ph type="body" idx="1"/>
           </p:nvPr>
         </p:nvSpPr>
         <p:spPr>
           <a:xfrm>
-            <a:off x="609600" y="1200936"/>
-            <a:ext cx="5303520" cy="4690836"/>
+            <a:off x="746397" y="1392390"/>
+            <a:ext cx="10479133" cy="4818820"/>
           </a:xfrm>
         </p:spPr>
         <p:txBody>
           <a:bodyPr/>
           <a:lstStyle/>
           <a:p>
-            <a:pPr marL="285750" indent="-285750">
+            <a:pPr>
               <a:lnSpc>
                 <a:spcPct val="107000"/>
               </a:lnSpc>
               <a:spcAft>
                 <a:spcPts val="800"/>
               </a:spcAft>
-              <a:buFont typeface="Wingdings" pitchFamily="2" charset="2"/>
-              <a:buChar char="Ø"/>
             </a:pPr>
             <a:r>
-              <a:rPr lang="en-US" sz="2000" kern="100" dirty="0">
+              <a:rPr lang="en-US" sz="2400" kern="100" dirty="0">
                 <a:effectLst/>
                 <a:latin typeface="Times New Roman" panose="02020603050405020304" pitchFamily="18" charset="0"/>
                 <a:ea typeface="Calibri" panose="020F0502020204030204" pitchFamily="34" charset="0"/>
                 <a:cs typeface="Times New Roman" panose="02020603050405020304" pitchFamily="18" charset="0"/>
               </a:rPr>
-              <a:t>For field which are ‘text’ type is checked for the entered value is alphabetic or not using </a:t>
-            </a:r>
-            <a:r>
-              <a:rPr lang="en-US" sz="2000" kern="100" dirty="0" err="1">
-                <a:effectLst/>
-                <a:latin typeface="Times New Roman" panose="02020603050405020304" pitchFamily="18" charset="0"/>
-                <a:ea typeface="Calibri" panose="020F0502020204030204" pitchFamily="34" charset="0"/>
-                <a:cs typeface="Times New Roman" panose="02020603050405020304" pitchFamily="18" charset="0"/>
-              </a:rPr>
-              <a:t>alphabetic.test</a:t>
-            </a:r>
-            <a:r>
-              <a:rPr lang="en-US" sz="2000" kern="100" dirty="0">
-                <a:effectLst/>
-                <a:latin typeface="Times New Roman" panose="02020603050405020304" pitchFamily="18" charset="0"/>
-                <a:ea typeface="Calibri" panose="020F0502020204030204" pitchFamily="34" charset="0"/>
-                <a:cs typeface="Times New Roman" panose="02020603050405020304" pitchFamily="18" charset="0"/>
-              </a:rPr>
-              <a:t>(</a:t>
-            </a:r>
-            <a:r>
-              <a:rPr lang="en-US" sz="2000" kern="100" dirty="0" err="1">
-                <a:effectLst/>
-                <a:latin typeface="Times New Roman" panose="02020603050405020304" pitchFamily="18" charset="0"/>
-                <a:ea typeface="Calibri" panose="020F0502020204030204" pitchFamily="34" charset="0"/>
-                <a:cs typeface="Times New Roman" panose="02020603050405020304" pitchFamily="18" charset="0"/>
-              </a:rPr>
-              <a:t>fieldValue</a:t>
-            </a:r>
-            <a:r>
-              <a:rPr lang="en-US" sz="2000" kern="100" dirty="0">
-                <a:effectLst/>
-                <a:latin typeface="Times New Roman" panose="02020603050405020304" pitchFamily="18" charset="0"/>
-                <a:ea typeface="Calibri" panose="020F0502020204030204" pitchFamily="34" charset="0"/>
-                <a:cs typeface="Times New Roman" panose="02020603050405020304" pitchFamily="18" charset="0"/>
-              </a:rPr>
-              <a:t>). If not, an error is displayed.</a:t>
-            </a:r>
-            <a:br>
-              <a:rPr lang="en-US" sz="2000" kern="100" dirty="0">
-                <a:effectLst/>
-                <a:latin typeface="Times New Roman" panose="02020603050405020304" pitchFamily="18" charset="0"/>
-                <a:ea typeface="Calibri" panose="020F0502020204030204" pitchFamily="34" charset="0"/>
-                <a:cs typeface="Times New Roman" panose="02020603050405020304" pitchFamily="18" charset="0"/>
-              </a:rPr>
-            </a:br>
-            <a:r>
-              <a:rPr lang="en-US" sz="2000" kern="100" dirty="0">
-                <a:effectLst/>
-                <a:latin typeface="Times New Roman" panose="02020603050405020304" pitchFamily="18" charset="0"/>
-                <a:ea typeface="Calibri" panose="020F0502020204030204" pitchFamily="34" charset="0"/>
-                <a:cs typeface="Times New Roman" panose="02020603050405020304" pitchFamily="18" charset="0"/>
-              </a:rPr>
-              <a:t>For field which are ‘number’ type is checked for the entered value is numeric or not using </a:t>
-            </a:r>
-            <a:r>
-              <a:rPr lang="en-US" sz="2000" kern="100" dirty="0" err="1">
-                <a:effectLst/>
-                <a:latin typeface="Times New Roman" panose="02020603050405020304" pitchFamily="18" charset="0"/>
-                <a:ea typeface="Calibri" panose="020F0502020204030204" pitchFamily="34" charset="0"/>
-                <a:cs typeface="Times New Roman" panose="02020603050405020304" pitchFamily="18" charset="0"/>
-              </a:rPr>
-              <a:t>isNan</a:t>
-            </a:r>
-            <a:r>
-              <a:rPr lang="en-US" sz="2000" kern="100" dirty="0">
-                <a:effectLst/>
-                <a:latin typeface="Times New Roman" panose="02020603050405020304" pitchFamily="18" charset="0"/>
-                <a:ea typeface="Calibri" panose="020F0502020204030204" pitchFamily="34" charset="0"/>
-                <a:cs typeface="Times New Roman" panose="02020603050405020304" pitchFamily="18" charset="0"/>
-              </a:rPr>
-              <a:t>(</a:t>
-            </a:r>
-            <a:r>
-              <a:rPr lang="en-US" sz="2000" kern="100" dirty="0" err="1">
-                <a:effectLst/>
-                <a:latin typeface="Times New Roman" panose="02020603050405020304" pitchFamily="18" charset="0"/>
-                <a:ea typeface="Calibri" panose="020F0502020204030204" pitchFamily="34" charset="0"/>
-                <a:cs typeface="Times New Roman" panose="02020603050405020304" pitchFamily="18" charset="0"/>
-              </a:rPr>
-              <a:t>fieldValue</a:t>
-            </a:r>
-            <a:r>
-              <a:rPr lang="en-US" sz="2000" kern="100" dirty="0">
-                <a:effectLst/>
-                <a:latin typeface="Times New Roman" panose="02020603050405020304" pitchFamily="18" charset="0"/>
-                <a:ea typeface="Calibri" panose="020F0502020204030204" pitchFamily="34" charset="0"/>
-                <a:cs typeface="Times New Roman" panose="02020603050405020304" pitchFamily="18" charset="0"/>
-              </a:rPr>
-              <a:t>). If not, an error is displayed.</a:t>
-            </a:r>
-            <a:br>
-              <a:rPr lang="en-US" sz="2000" kern="100" dirty="0">
-                <a:effectLst/>
-                <a:latin typeface="Times New Roman" panose="02020603050405020304" pitchFamily="18" charset="0"/>
-                <a:ea typeface="Calibri" panose="020F0502020204030204" pitchFamily="34" charset="0"/>
-                <a:cs typeface="Times New Roman" panose="02020603050405020304" pitchFamily="18" charset="0"/>
-              </a:rPr>
-            </a:br>
-            <a:r>
-              <a:rPr lang="en-US" sz="2000" kern="100" dirty="0">
-                <a:effectLst/>
-                <a:latin typeface="Times New Roman" panose="02020603050405020304" pitchFamily="18" charset="0"/>
-                <a:ea typeface="Calibri" panose="020F0502020204030204" pitchFamily="34" charset="0"/>
-                <a:cs typeface="Times New Roman" panose="02020603050405020304" pitchFamily="18" charset="0"/>
-              </a:rPr>
-              <a:t>For field which are ‘select-one’ type is checked if a valid option is selected or not. If not, an error is displayed.</a:t>
-            </a:r>
-            <a:endParaRPr lang="en-IN" sz="2000" kern="100" dirty="0">
+              <a:t>We performed the data cleaning using following steps:</a:t>
+            </a:r>
+            <a:endParaRPr lang="en-IN" sz="2400" kern="100" dirty="0">
               <a:effectLst/>
               <a:latin typeface="Times New Roman" panose="02020603050405020304" pitchFamily="18" charset="0"/>
               <a:ea typeface="Calibri" panose="020F0502020204030204" pitchFamily="34" charset="0"/>
@@ -8467,118 +8460,143 @@
             </a:endParaRPr>
           </a:p>
           <a:p>
-            <a:pPr marL="285750" indent="-285750">
+            <a:pPr marL="342900" lvl="0" indent="-342900">
               <a:lnSpc>
                 <a:spcPct val="107000"/>
               </a:lnSpc>
-              <a:spcAft>
-                <a:spcPts val="800"/>
-              </a:spcAft>
-              <a:buFont typeface="Wingdings" pitchFamily="2" charset="2"/>
-              <a:buChar char="Ø"/>
+              <a:buFont typeface="Symbol" pitchFamily="2" charset="2"/>
+              <a:buChar char=""/>
             </a:pPr>
             <a:r>
-              <a:rPr lang="en-US" sz="2000" kern="100" dirty="0">
+              <a:rPr lang="en-US" sz="2400" b="1" u="sng" kern="100" dirty="0">
                 <a:effectLst/>
                 <a:latin typeface="Times New Roman" panose="02020603050405020304" pitchFamily="18" charset="0"/>
                 <a:ea typeface="Calibri" panose="020F0502020204030204" pitchFamily="34" charset="0"/>
                 <a:cs typeface="Times New Roman" panose="02020603050405020304" pitchFamily="18" charset="0"/>
               </a:rPr>
-              <a:t>With this validation, the user input is checked if the input meets the criteria for each field. The error messages are displayed, which helps the user to know if the validation is failed.</a:t>
-            </a:r>
-            <a:endParaRPr lang="en-IN" sz="2000" kern="100" dirty="0">
+              <a:t>Duplicates</a:t>
+            </a:r>
+            <a:r>
+              <a:rPr lang="en-US" sz="2400" kern="100" dirty="0">
+                <a:effectLst/>
+                <a:latin typeface="Times New Roman" panose="02020603050405020304" pitchFamily="18" charset="0"/>
+                <a:ea typeface="Calibri" panose="020F0502020204030204" pitchFamily="34" charset="0"/>
+                <a:cs typeface="Times New Roman" panose="02020603050405020304" pitchFamily="18" charset="0"/>
+              </a:rPr>
+              <a:t>: Duplicates can be classified into two types, that is exact and near duplicates. The exact duplicates are easier to identify as they are the same values.  Near duplicates are the result of formatting, missing values, etc. </a:t>
+            </a:r>
+            <a:endParaRPr lang="en-IN" sz="2400" kern="100" dirty="0">
               <a:effectLst/>
               <a:latin typeface="Times New Roman" panose="02020603050405020304" pitchFamily="18" charset="0"/>
               <a:ea typeface="Calibri" panose="020F0502020204030204" pitchFamily="34" charset="0"/>
               <a:cs typeface="Times New Roman" panose="02020603050405020304" pitchFamily="18" charset="0"/>
             </a:endParaRPr>
           </a:p>
-        </p:txBody>
-      </p:sp>
-      <p:pic>
-        <p:nvPicPr>
-          <p:cNvPr id="7" name="Picture 6">
-            <a:extLst>
-              <a:ext uri="{FF2B5EF4-FFF2-40B4-BE49-F238E27FC236}">
-                <a16:creationId xmlns:a16="http://schemas.microsoft.com/office/drawing/2014/main" id="{8A12F6D9-C7E5-9AB3-2C48-8D419334C760}"/>
-              </a:ext>
-            </a:extLst>
-          </p:cNvPr>
-          <p:cNvPicPr>
-            <a:picLocks noChangeAspect="1"/>
-          </p:cNvPicPr>
-          <p:nvPr/>
-        </p:nvPicPr>
-        <p:blipFill>
-          <a:blip r:embed="rId2"/>
-          <a:stretch>
-            <a:fillRect/>
-          </a:stretch>
-        </p:blipFill>
-        <p:spPr>
-          <a:xfrm>
-            <a:off x="6278563" y="1219200"/>
-            <a:ext cx="5303837" cy="4884738"/>
-          </a:xfrm>
-          <a:prstGeom prst="rect">
-            <a:avLst/>
-          </a:prstGeom>
-        </p:spPr>
-      </p:pic>
-      <p:sp>
-        <p:nvSpPr>
-          <p:cNvPr id="8" name="AutoShape 6">
-            <a:extLst>
-              <a:ext uri="{FF2B5EF4-FFF2-40B4-BE49-F238E27FC236}">
-                <a16:creationId xmlns:a16="http://schemas.microsoft.com/office/drawing/2014/main" id="{CEAA1D11-64FE-F8BC-966D-E68B0EE67D2F}"/>
-              </a:ext>
-            </a:extLst>
-          </p:cNvPr>
-          <p:cNvSpPr>
-            <a:spLocks noGrp="1" noChangeAspect="1" noChangeArrowheads="1"/>
-          </p:cNvSpPr>
-          <p:nvPr>
-            <p:ph sz="half" idx="3"/>
-          </p:nvPr>
-        </p:nvSpPr>
-        <p:spPr bwMode="auto">
-          <a:xfrm>
-            <a:off x="6278563" y="608633"/>
-            <a:ext cx="5303837" cy="523220"/>
-          </a:xfrm>
-          <a:prstGeom prst="rect">
-            <a:avLst/>
-          </a:prstGeom>
-          <a:noFill/>
-          <a:extLst>
-            <a:ext uri="{909E8E84-426E-40DD-AFC4-6F175D3DCCD1}">
-              <a14:hiddenFill xmlns:a14="http://schemas.microsoft.com/office/drawing/2010/main">
-                <a:solidFill>
-                  <a:srgbClr val="FFFFFF"/>
-                </a:solidFill>
-              </a14:hiddenFill>
-            </a:ext>
-          </a:extLst>
-        </p:spPr>
-        <p:txBody>
-          <a:bodyPr vert="horz" wrap="square" lIns="91440" tIns="45720" rIns="91440" bIns="45720" numCol="1" anchor="t" anchorCtr="0" compatLnSpc="1">
-            <a:prstTxWarp prst="textNoShape">
-              <a:avLst/>
-            </a:prstTxWarp>
-          </a:bodyPr>
-          <a:lstStyle/>
-          <a:p>
-            <a:r>
-              <a:rPr lang="en-US" b="1" dirty="0"/>
-              <a:t>UI Validation Form:</a:t>
-            </a:r>
+          <a:p>
+            <a:pPr marL="342900" lvl="0" indent="-342900">
+              <a:lnSpc>
+                <a:spcPct val="107000"/>
+              </a:lnSpc>
+              <a:buFont typeface="Symbol" pitchFamily="2" charset="2"/>
+              <a:buChar char=""/>
+            </a:pPr>
+            <a:r>
+              <a:rPr lang="en-US" sz="2400" b="1" u="sng" kern="100" dirty="0">
+                <a:effectLst/>
+                <a:latin typeface="Times New Roman" panose="02020603050405020304" pitchFamily="18" charset="0"/>
+                <a:ea typeface="Calibri" panose="020F0502020204030204" pitchFamily="34" charset="0"/>
+                <a:cs typeface="Times New Roman" panose="02020603050405020304" pitchFamily="18" charset="0"/>
+              </a:rPr>
+              <a:t>Null</a:t>
+            </a:r>
+            <a:r>
+              <a:rPr lang="en-US" sz="2400" kern="100" dirty="0">
+                <a:effectLst/>
+                <a:latin typeface="Times New Roman" panose="02020603050405020304" pitchFamily="18" charset="0"/>
+                <a:ea typeface="Calibri" panose="020F0502020204030204" pitchFamily="34" charset="0"/>
+                <a:cs typeface="Times New Roman" panose="02020603050405020304" pitchFamily="18" charset="0"/>
+              </a:rPr>
+              <a:t>: The best way to remove the null values in the dataset is to either delete it or perform imputation. </a:t>
+            </a:r>
+            <a:endParaRPr lang="en-IN" sz="2400" kern="100" dirty="0">
+              <a:effectLst/>
+              <a:latin typeface="Times New Roman" panose="02020603050405020304" pitchFamily="18" charset="0"/>
+              <a:ea typeface="Calibri" panose="020F0502020204030204" pitchFamily="34" charset="0"/>
+              <a:cs typeface="Times New Roman" panose="02020603050405020304" pitchFamily="18" charset="0"/>
+            </a:endParaRPr>
+          </a:p>
+          <a:p>
+            <a:pPr marL="342900" lvl="0" indent="-342900">
+              <a:lnSpc>
+                <a:spcPct val="107000"/>
+              </a:lnSpc>
+              <a:buFont typeface="Symbol" pitchFamily="2" charset="2"/>
+              <a:buChar char=""/>
+            </a:pPr>
+            <a:r>
+              <a:rPr lang="en-US" sz="2400" b="1" u="sng" kern="100" dirty="0">
+                <a:effectLst/>
+                <a:latin typeface="Times New Roman" panose="02020603050405020304" pitchFamily="18" charset="0"/>
+                <a:ea typeface="Calibri" panose="020F0502020204030204" pitchFamily="34" charset="0"/>
+                <a:cs typeface="Times New Roman" panose="02020603050405020304" pitchFamily="18" charset="0"/>
+              </a:rPr>
+              <a:t>NA records: </a:t>
+            </a:r>
+            <a:r>
+              <a:rPr lang="en-US" sz="2400" kern="100" dirty="0">
+                <a:effectLst/>
+                <a:latin typeface="Times New Roman" panose="02020603050405020304" pitchFamily="18" charset="0"/>
+                <a:ea typeface="Calibri" panose="020F0502020204030204" pitchFamily="34" charset="0"/>
+                <a:cs typeface="Times New Roman" panose="02020603050405020304" pitchFamily="18" charset="0"/>
+              </a:rPr>
+              <a:t>The best way to deal with the NA records is similar to handling of null record, that is either we delete the missing data rows or impute a value in place of the NA value .</a:t>
+            </a:r>
+          </a:p>
+          <a:p>
+            <a:pPr marL="342900" lvl="0" indent="-342900">
+              <a:lnSpc>
+                <a:spcPct val="107000"/>
+              </a:lnSpc>
+              <a:buFont typeface="Symbol" pitchFamily="2" charset="2"/>
+              <a:buChar char=""/>
+            </a:pPr>
+            <a:r>
+              <a:rPr lang="en-US" sz="2400" b="1" u="sng" kern="100" dirty="0">
+                <a:effectLst/>
+                <a:latin typeface="Times New Roman" panose="02020603050405020304" pitchFamily="18" charset="0"/>
+                <a:ea typeface="Calibri" panose="020F0502020204030204" pitchFamily="34" charset="0"/>
+                <a:cs typeface="Times New Roman" panose="02020603050405020304" pitchFamily="18" charset="0"/>
+              </a:rPr>
+              <a:t>Empty records</a:t>
+            </a:r>
+            <a:r>
+              <a:rPr lang="en-US" sz="2400" kern="100" dirty="0">
+                <a:effectLst/>
+                <a:latin typeface="Times New Roman" panose="02020603050405020304" pitchFamily="18" charset="0"/>
+                <a:ea typeface="Calibri" panose="020F0502020204030204" pitchFamily="34" charset="0"/>
+                <a:cs typeface="Times New Roman" panose="02020603050405020304" pitchFamily="18" charset="0"/>
+              </a:rPr>
+              <a:t>: The handling of empty records in a dataset is the same as we handle null records.</a:t>
+            </a:r>
+            <a:endParaRPr lang="en-IN" sz="2400" kern="100" dirty="0">
+              <a:effectLst/>
+              <a:latin typeface="Times New Roman" panose="02020603050405020304" pitchFamily="18" charset="0"/>
+              <a:ea typeface="Calibri" panose="020F0502020204030204" pitchFamily="34" charset="0"/>
+              <a:cs typeface="Times New Roman" panose="02020603050405020304" pitchFamily="18" charset="0"/>
+            </a:endParaRPr>
+          </a:p>
+          <a:p>
+            <a:endParaRPr lang="en-US" sz="2400" dirty="0">
+              <a:latin typeface="Times New Roman" panose="02020603050405020304" pitchFamily="18" charset="0"/>
+              <a:cs typeface="Times New Roman" panose="02020603050405020304" pitchFamily="18" charset="0"/>
+            </a:endParaRPr>
           </a:p>
         </p:txBody>
       </p:sp>
     </p:spTree>
     <p:extLst>
       <p:ext uri="{BB962C8B-B14F-4D97-AF65-F5344CB8AC3E}">
-        <p14:creationId xmlns:p14="http://schemas.microsoft.com/office/powerpoint/2010/main" val="3263447098"/>
+        <p14:creationId xmlns:p14="http://schemas.microsoft.com/office/powerpoint/2010/main" val="1657495668"/>
       </p:ext>
     </p:extLst>
   </p:cSld>

</xml_diff>